<commit_message>
update presentatie sprint 1
</commit_message>
<xml_diff>
--- a/Analyse/sprint1presentatie.pptx
+++ b/Analyse/sprint1presentatie.pptx
@@ -1,25 +1,32 @@
 
 <file path=ppt/presentation.xml><?xml version="1.0" encoding="utf-8"?>
-<p:presentation xmlns:a="http://schemas.openxmlformats.org/drawingml/2006/main" xmlns:r="http://schemas.openxmlformats.org/officeDocument/2006/relationships" xmlns:p="http://schemas.openxmlformats.org/presentationml/2006/main" saveSubsetFonts="1">
+<p:presentation xmlns:a="http://schemas.openxmlformats.org/drawingml/2006/main" xmlns:r="http://schemas.openxmlformats.org/officeDocument/2006/relationships" xmlns:p="http://schemas.openxmlformats.org/presentationml/2006/main" showSpecialPlsOnTitleSld="0" saveSubsetFonts="1">
   <p:sldMasterIdLst>
     <p:sldMasterId id="2147483660" r:id="rId1"/>
   </p:sldMasterIdLst>
+  <p:notesMasterIdLst>
+    <p:notesMasterId r:id="rId21"/>
+  </p:notesMasterIdLst>
   <p:sldIdLst>
     <p:sldId id="256" r:id="rId2"/>
     <p:sldId id="258" r:id="rId3"/>
-    <p:sldId id="257" r:id="rId4"/>
-    <p:sldId id="259" r:id="rId5"/>
-    <p:sldId id="260" r:id="rId6"/>
-    <p:sldId id="261" r:id="rId7"/>
-    <p:sldId id="263" r:id="rId8"/>
-    <p:sldId id="267" r:id="rId9"/>
-    <p:sldId id="268" r:id="rId10"/>
-    <p:sldId id="265" r:id="rId11"/>
-    <p:sldId id="266" r:id="rId12"/>
-    <p:sldId id="262" r:id="rId13"/>
-    <p:sldId id="264" r:id="rId14"/>
-    <p:sldId id="269" r:id="rId15"/>
-    <p:sldId id="270" r:id="rId16"/>
+    <p:sldId id="271" r:id="rId4"/>
+    <p:sldId id="257" r:id="rId5"/>
+    <p:sldId id="259" r:id="rId6"/>
+    <p:sldId id="260" r:id="rId7"/>
+    <p:sldId id="261" r:id="rId8"/>
+    <p:sldId id="263" r:id="rId9"/>
+    <p:sldId id="272" r:id="rId10"/>
+    <p:sldId id="273" r:id="rId11"/>
+    <p:sldId id="267" r:id="rId12"/>
+    <p:sldId id="268" r:id="rId13"/>
+    <p:sldId id="265" r:id="rId14"/>
+    <p:sldId id="266" r:id="rId15"/>
+    <p:sldId id="262" r:id="rId16"/>
+    <p:sldId id="264" r:id="rId17"/>
+    <p:sldId id="269" r:id="rId18"/>
+    <p:sldId id="274" r:id="rId19"/>
+    <p:sldId id="270" r:id="rId20"/>
   </p:sldIdLst>
   <p:sldSz cx="9144000" cy="6858000" type="screen4x3"/>
   <p:notesSz cx="6858000" cy="9144000"/>
@@ -118,7 +125,457 @@
       </a:defRPr>
     </a:lvl9pPr>
   </p:defaultTextStyle>
+  <p:extLst>
+    <p:ext uri="{EFAFB233-063F-42B5-8137-9DF3F51BA10A}">
+      <p15:sldGuideLst xmlns:p15="http://schemas.microsoft.com/office/powerpoint/2012/main">
+        <p15:guide id="1" orient="horz" pos="2160">
+          <p15:clr>
+            <a:srgbClr val="A4A3A4"/>
+          </p15:clr>
+        </p15:guide>
+        <p15:guide id="2" pos="2880">
+          <p15:clr>
+            <a:srgbClr val="A4A3A4"/>
+          </p15:clr>
+        </p15:guide>
+      </p15:sldGuideLst>
+    </p:ext>
+  </p:extLst>
 </p:presentation>
+</file>
+
+<file path=ppt/notesMasters/notesMaster1.xml><?xml version="1.0" encoding="utf-8"?>
+<p:notesMaster xmlns:a="http://schemas.openxmlformats.org/drawingml/2006/main" xmlns:r="http://schemas.openxmlformats.org/officeDocument/2006/relationships" xmlns:p="http://schemas.openxmlformats.org/presentationml/2006/main">
+  <p:cSld>
+    <p:bg>
+      <p:bgRef idx="1001">
+        <a:schemeClr val="bg1"/>
+      </p:bgRef>
+    </p:bg>
+    <p:spTree>
+      <p:nvGrpSpPr>
+        <p:cNvPr id="1" name=""/>
+        <p:cNvGrpSpPr/>
+        <p:nvPr/>
+      </p:nvGrpSpPr>
+      <p:grpSpPr>
+        <a:xfrm>
+          <a:off x="0" y="0"/>
+          <a:ext cx="0" cy="0"/>
+          <a:chOff x="0" y="0"/>
+          <a:chExt cx="0" cy="0"/>
+        </a:xfrm>
+      </p:grpSpPr>
+      <p:sp>
+        <p:nvSpPr>
+          <p:cNvPr id="2" name="Header Placeholder 1"/>
+          <p:cNvSpPr>
+            <a:spLocks noGrp="1"/>
+          </p:cNvSpPr>
+          <p:nvPr>
+            <p:ph type="hdr" sz="quarter"/>
+          </p:nvPr>
+        </p:nvSpPr>
+        <p:spPr>
+          <a:xfrm>
+            <a:off x="0" y="0"/>
+            <a:ext cx="2971800" cy="458788"/>
+          </a:xfrm>
+          <a:prstGeom prst="rect">
+            <a:avLst/>
+          </a:prstGeom>
+        </p:spPr>
+        <p:txBody>
+          <a:bodyPr vert="horz" lIns="91440" tIns="45720" rIns="91440" bIns="45720" rtlCol="0"/>
+          <a:lstStyle>
+            <a:lvl1pPr algn="l">
+              <a:defRPr sz="1200"/>
+            </a:lvl1pPr>
+          </a:lstStyle>
+          <a:p>
+            <a:endParaRPr lang="nl-BE"/>
+          </a:p>
+        </p:txBody>
+      </p:sp>
+      <p:sp>
+        <p:nvSpPr>
+          <p:cNvPr id="3" name="Date Placeholder 2"/>
+          <p:cNvSpPr>
+            <a:spLocks noGrp="1"/>
+          </p:cNvSpPr>
+          <p:nvPr>
+            <p:ph type="dt" idx="1"/>
+          </p:nvPr>
+        </p:nvSpPr>
+        <p:spPr>
+          <a:xfrm>
+            <a:off x="3884613" y="0"/>
+            <a:ext cx="2971800" cy="458788"/>
+          </a:xfrm>
+          <a:prstGeom prst="rect">
+            <a:avLst/>
+          </a:prstGeom>
+        </p:spPr>
+        <p:txBody>
+          <a:bodyPr vert="horz" lIns="91440" tIns="45720" rIns="91440" bIns="45720" rtlCol="0"/>
+          <a:lstStyle>
+            <a:lvl1pPr algn="r">
+              <a:defRPr sz="1200"/>
+            </a:lvl1pPr>
+          </a:lstStyle>
+          <a:p>
+            <a:fld id="{33A00747-4DA9-4CBC-A248-4C78DE15643C}" type="datetimeFigureOut">
+              <a:rPr lang="nl-BE" smtClean="0"/>
+              <a:t>7/03/2016</a:t>
+            </a:fld>
+            <a:endParaRPr lang="nl-BE"/>
+          </a:p>
+        </p:txBody>
+      </p:sp>
+      <p:sp>
+        <p:nvSpPr>
+          <p:cNvPr id="4" name="Slide Image Placeholder 3"/>
+          <p:cNvSpPr>
+            <a:spLocks noGrp="1" noRot="1" noChangeAspect="1"/>
+          </p:cNvSpPr>
+          <p:nvPr>
+            <p:ph type="sldImg" idx="2"/>
+          </p:nvPr>
+        </p:nvSpPr>
+        <p:spPr>
+          <a:xfrm>
+            <a:off x="1371600" y="1143000"/>
+            <a:ext cx="4114800" cy="3086100"/>
+          </a:xfrm>
+          <a:prstGeom prst="rect">
+            <a:avLst/>
+          </a:prstGeom>
+          <a:noFill/>
+          <a:ln w="12700">
+            <a:solidFill>
+              <a:prstClr val="black"/>
+            </a:solidFill>
+          </a:ln>
+        </p:spPr>
+        <p:txBody>
+          <a:bodyPr vert="horz" lIns="91440" tIns="45720" rIns="91440" bIns="45720" rtlCol="0" anchor="ctr"/>
+          <a:lstStyle/>
+          <a:p>
+            <a:endParaRPr lang="nl-BE"/>
+          </a:p>
+        </p:txBody>
+      </p:sp>
+      <p:sp>
+        <p:nvSpPr>
+          <p:cNvPr id="5" name="Notes Placeholder 4"/>
+          <p:cNvSpPr>
+            <a:spLocks noGrp="1"/>
+          </p:cNvSpPr>
+          <p:nvPr>
+            <p:ph type="body" sz="quarter" idx="3"/>
+          </p:nvPr>
+        </p:nvSpPr>
+        <p:spPr>
+          <a:xfrm>
+            <a:off x="685800" y="4400550"/>
+            <a:ext cx="5486400" cy="3600450"/>
+          </a:xfrm>
+          <a:prstGeom prst="rect">
+            <a:avLst/>
+          </a:prstGeom>
+        </p:spPr>
+        <p:txBody>
+          <a:bodyPr vert="horz" lIns="91440" tIns="45720" rIns="91440" bIns="45720" rtlCol="0"/>
+          <a:lstStyle/>
+          <a:p>
+            <a:pPr lvl="0"/>
+            <a:r>
+              <a:rPr lang="en-US" smtClean="0"/>
+              <a:t>Click to edit Master text styles</a:t>
+            </a:r>
+          </a:p>
+          <a:p>
+            <a:pPr lvl="1"/>
+            <a:r>
+              <a:rPr lang="en-US" smtClean="0"/>
+              <a:t>Second level</a:t>
+            </a:r>
+          </a:p>
+          <a:p>
+            <a:pPr lvl="2"/>
+            <a:r>
+              <a:rPr lang="en-US" smtClean="0"/>
+              <a:t>Third level</a:t>
+            </a:r>
+          </a:p>
+          <a:p>
+            <a:pPr lvl="3"/>
+            <a:r>
+              <a:rPr lang="en-US" smtClean="0"/>
+              <a:t>Fourth level</a:t>
+            </a:r>
+          </a:p>
+          <a:p>
+            <a:pPr lvl="4"/>
+            <a:r>
+              <a:rPr lang="en-US" smtClean="0"/>
+              <a:t>Fifth level</a:t>
+            </a:r>
+            <a:endParaRPr lang="nl-BE"/>
+          </a:p>
+        </p:txBody>
+      </p:sp>
+      <p:sp>
+        <p:nvSpPr>
+          <p:cNvPr id="6" name="Footer Placeholder 5"/>
+          <p:cNvSpPr>
+            <a:spLocks noGrp="1"/>
+          </p:cNvSpPr>
+          <p:nvPr>
+            <p:ph type="ftr" sz="quarter" idx="4"/>
+          </p:nvPr>
+        </p:nvSpPr>
+        <p:spPr>
+          <a:xfrm>
+            <a:off x="0" y="8685213"/>
+            <a:ext cx="2971800" cy="458787"/>
+          </a:xfrm>
+          <a:prstGeom prst="rect">
+            <a:avLst/>
+          </a:prstGeom>
+        </p:spPr>
+        <p:txBody>
+          <a:bodyPr vert="horz" lIns="91440" tIns="45720" rIns="91440" bIns="45720" rtlCol="0" anchor="b"/>
+          <a:lstStyle>
+            <a:lvl1pPr algn="l">
+              <a:defRPr sz="1200"/>
+            </a:lvl1pPr>
+          </a:lstStyle>
+          <a:p>
+            <a:endParaRPr lang="nl-BE"/>
+          </a:p>
+        </p:txBody>
+      </p:sp>
+      <p:sp>
+        <p:nvSpPr>
+          <p:cNvPr id="7" name="Slide Number Placeholder 6"/>
+          <p:cNvSpPr>
+            <a:spLocks noGrp="1"/>
+          </p:cNvSpPr>
+          <p:nvPr>
+            <p:ph type="sldNum" sz="quarter" idx="5"/>
+          </p:nvPr>
+        </p:nvSpPr>
+        <p:spPr>
+          <a:xfrm>
+            <a:off x="3884613" y="8685213"/>
+            <a:ext cx="2971800" cy="458787"/>
+          </a:xfrm>
+          <a:prstGeom prst="rect">
+            <a:avLst/>
+          </a:prstGeom>
+        </p:spPr>
+        <p:txBody>
+          <a:bodyPr vert="horz" lIns="91440" tIns="45720" rIns="91440" bIns="45720" rtlCol="0" anchor="b"/>
+          <a:lstStyle>
+            <a:lvl1pPr algn="r">
+              <a:defRPr sz="1200"/>
+            </a:lvl1pPr>
+          </a:lstStyle>
+          <a:p>
+            <a:fld id="{6E8EBF9D-A4FA-4D16-852E-EFA33CC84575}" type="slidenum">
+              <a:rPr lang="nl-BE" smtClean="0"/>
+              <a:t>‹#›</a:t>
+            </a:fld>
+            <a:endParaRPr lang="nl-BE"/>
+          </a:p>
+        </p:txBody>
+      </p:sp>
+    </p:spTree>
+    <p:extLst>
+      <p:ext uri="{BB962C8B-B14F-4D97-AF65-F5344CB8AC3E}">
+        <p14:creationId xmlns:p14="http://schemas.microsoft.com/office/powerpoint/2010/main" val="1405792670"/>
+      </p:ext>
+    </p:extLst>
+  </p:cSld>
+  <p:clrMap bg1="lt1" tx1="dk1" bg2="lt2" tx2="dk2" accent1="accent1" accent2="accent2" accent3="accent3" accent4="accent4" accent5="accent5" accent6="accent6" hlink="hlink" folHlink="folHlink"/>
+  <p:notesStyle>
+    <a:lvl1pPr marL="0" algn="l" defTabSz="914400" rtl="0" eaLnBrk="1" latinLnBrk="0" hangingPunct="1">
+      <a:defRPr sz="1200" kern="1200">
+        <a:solidFill>
+          <a:schemeClr val="tx1"/>
+        </a:solidFill>
+        <a:latin typeface="+mn-lt"/>
+        <a:ea typeface="+mn-ea"/>
+        <a:cs typeface="+mn-cs"/>
+      </a:defRPr>
+    </a:lvl1pPr>
+    <a:lvl2pPr marL="457200" algn="l" defTabSz="914400" rtl="0" eaLnBrk="1" latinLnBrk="0" hangingPunct="1">
+      <a:defRPr sz="1200" kern="1200">
+        <a:solidFill>
+          <a:schemeClr val="tx1"/>
+        </a:solidFill>
+        <a:latin typeface="+mn-lt"/>
+        <a:ea typeface="+mn-ea"/>
+        <a:cs typeface="+mn-cs"/>
+      </a:defRPr>
+    </a:lvl2pPr>
+    <a:lvl3pPr marL="914400" algn="l" defTabSz="914400" rtl="0" eaLnBrk="1" latinLnBrk="0" hangingPunct="1">
+      <a:defRPr sz="1200" kern="1200">
+        <a:solidFill>
+          <a:schemeClr val="tx1"/>
+        </a:solidFill>
+        <a:latin typeface="+mn-lt"/>
+        <a:ea typeface="+mn-ea"/>
+        <a:cs typeface="+mn-cs"/>
+      </a:defRPr>
+    </a:lvl3pPr>
+    <a:lvl4pPr marL="1371600" algn="l" defTabSz="914400" rtl="0" eaLnBrk="1" latinLnBrk="0" hangingPunct="1">
+      <a:defRPr sz="1200" kern="1200">
+        <a:solidFill>
+          <a:schemeClr val="tx1"/>
+        </a:solidFill>
+        <a:latin typeface="+mn-lt"/>
+        <a:ea typeface="+mn-ea"/>
+        <a:cs typeface="+mn-cs"/>
+      </a:defRPr>
+    </a:lvl4pPr>
+    <a:lvl5pPr marL="1828800" algn="l" defTabSz="914400" rtl="0" eaLnBrk="1" latinLnBrk="0" hangingPunct="1">
+      <a:defRPr sz="1200" kern="1200">
+        <a:solidFill>
+          <a:schemeClr val="tx1"/>
+        </a:solidFill>
+        <a:latin typeface="+mn-lt"/>
+        <a:ea typeface="+mn-ea"/>
+        <a:cs typeface="+mn-cs"/>
+      </a:defRPr>
+    </a:lvl5pPr>
+    <a:lvl6pPr marL="2286000" algn="l" defTabSz="914400" rtl="0" eaLnBrk="1" latinLnBrk="0" hangingPunct="1">
+      <a:defRPr sz="1200" kern="1200">
+        <a:solidFill>
+          <a:schemeClr val="tx1"/>
+        </a:solidFill>
+        <a:latin typeface="+mn-lt"/>
+        <a:ea typeface="+mn-ea"/>
+        <a:cs typeface="+mn-cs"/>
+      </a:defRPr>
+    </a:lvl6pPr>
+    <a:lvl7pPr marL="2743200" algn="l" defTabSz="914400" rtl="0" eaLnBrk="1" latinLnBrk="0" hangingPunct="1">
+      <a:defRPr sz="1200" kern="1200">
+        <a:solidFill>
+          <a:schemeClr val="tx1"/>
+        </a:solidFill>
+        <a:latin typeface="+mn-lt"/>
+        <a:ea typeface="+mn-ea"/>
+        <a:cs typeface="+mn-cs"/>
+      </a:defRPr>
+    </a:lvl7pPr>
+    <a:lvl8pPr marL="3200400" algn="l" defTabSz="914400" rtl="0" eaLnBrk="1" latinLnBrk="0" hangingPunct="1">
+      <a:defRPr sz="1200" kern="1200">
+        <a:solidFill>
+          <a:schemeClr val="tx1"/>
+        </a:solidFill>
+        <a:latin typeface="+mn-lt"/>
+        <a:ea typeface="+mn-ea"/>
+        <a:cs typeface="+mn-cs"/>
+      </a:defRPr>
+    </a:lvl8pPr>
+    <a:lvl9pPr marL="3657600" algn="l" defTabSz="914400" rtl="0" eaLnBrk="1" latinLnBrk="0" hangingPunct="1">
+      <a:defRPr sz="1200" kern="1200">
+        <a:solidFill>
+          <a:schemeClr val="tx1"/>
+        </a:solidFill>
+        <a:latin typeface="+mn-lt"/>
+        <a:ea typeface="+mn-ea"/>
+        <a:cs typeface="+mn-cs"/>
+      </a:defRPr>
+    </a:lvl9pPr>
+  </p:notesStyle>
+</p:notesMaster>
+</file>
+
+<file path=ppt/notesSlides/notesSlide1.xml><?xml version="1.0" encoding="utf-8"?>
+<p:notes xmlns:a="http://schemas.openxmlformats.org/drawingml/2006/main" xmlns:r="http://schemas.openxmlformats.org/officeDocument/2006/relationships" xmlns:p="http://schemas.openxmlformats.org/presentationml/2006/main">
+  <p:cSld>
+    <p:spTree>
+      <p:nvGrpSpPr>
+        <p:cNvPr id="1" name=""/>
+        <p:cNvGrpSpPr/>
+        <p:nvPr/>
+      </p:nvGrpSpPr>
+      <p:grpSpPr>
+        <a:xfrm>
+          <a:off x="0" y="0"/>
+          <a:ext cx="0" cy="0"/>
+          <a:chOff x="0" y="0"/>
+          <a:chExt cx="0" cy="0"/>
+        </a:xfrm>
+      </p:grpSpPr>
+      <p:sp>
+        <p:nvSpPr>
+          <p:cNvPr id="2" name="Slide Image Placeholder 1"/>
+          <p:cNvSpPr>
+            <a:spLocks noGrp="1" noRot="1" noChangeAspect="1"/>
+          </p:cNvSpPr>
+          <p:nvPr>
+            <p:ph type="sldImg"/>
+          </p:nvPr>
+        </p:nvSpPr>
+        <p:spPr/>
+      </p:sp>
+      <p:sp>
+        <p:nvSpPr>
+          <p:cNvPr id="3" name="Notes Placeholder 2"/>
+          <p:cNvSpPr>
+            <a:spLocks noGrp="1"/>
+          </p:cNvSpPr>
+          <p:nvPr>
+            <p:ph type="body" idx="1"/>
+          </p:nvPr>
+        </p:nvSpPr>
+        <p:spPr/>
+        <p:txBody>
+          <a:bodyPr/>
+          <a:lstStyle/>
+          <a:p>
+            <a:endParaRPr lang="nl-BE"/>
+          </a:p>
+        </p:txBody>
+      </p:sp>
+      <p:sp>
+        <p:nvSpPr>
+          <p:cNvPr id="4" name="Slide Number Placeholder 3"/>
+          <p:cNvSpPr>
+            <a:spLocks noGrp="1"/>
+          </p:cNvSpPr>
+          <p:nvPr>
+            <p:ph type="sldNum" sz="quarter" idx="10"/>
+          </p:nvPr>
+        </p:nvSpPr>
+        <p:spPr/>
+        <p:txBody>
+          <a:bodyPr/>
+          <a:lstStyle/>
+          <a:p>
+            <a:fld id="{6E8EBF9D-A4FA-4D16-852E-EFA33CC84575}" type="slidenum">
+              <a:rPr lang="nl-BE" smtClean="0"/>
+              <a:t>1</a:t>
+            </a:fld>
+            <a:endParaRPr lang="nl-BE"/>
+          </a:p>
+        </p:txBody>
+      </p:sp>
+    </p:spTree>
+    <p:extLst>
+      <p:ext uri="{BB962C8B-B14F-4D97-AF65-F5344CB8AC3E}">
+        <p14:creationId xmlns:p14="http://schemas.microsoft.com/office/powerpoint/2010/main" val="3360558195"/>
+      </p:ext>
+    </p:extLst>
+  </p:cSld>
+  <p:clrMapOvr>
+    <a:masterClrMapping/>
+  </p:clrMapOvr>
+</p:notes>
 </file>
 
 <file path=ppt/slideLayouts/slideLayout1.xml><?xml version="1.0" encoding="utf-8"?>
@@ -2821,6 +3278,7 @@
     <p:sldLayoutId id="2147483670" r:id="rId10"/>
     <p:sldLayoutId id="2147483671" r:id="rId11"/>
   </p:sldLayoutIdLst>
+  <p:hf hdr="0" ftr="0" dt="0"/>
   <p:txStyles>
     <p:titleStyle>
       <a:lvl1pPr algn="l" rtl="0" eaLnBrk="1" fontAlgn="base" hangingPunct="1">
@@ -3241,12 +3699,110 @@
             <p:ph type="subTitle" idx="1"/>
           </p:nvPr>
         </p:nvSpPr>
-        <p:spPr/>
+        <p:spPr>
+          <a:xfrm>
+            <a:off x="1447800" y="3212976"/>
+            <a:ext cx="7315200" cy="2808312"/>
+          </a:xfrm>
+        </p:spPr>
         <p:txBody>
           <a:bodyPr/>
           <a:lstStyle/>
           <a:p>
-            <a:endParaRPr lang="nl-BE" dirty="0"/>
+            <a:pPr algn="r"/>
+            <a:r>
+              <a:rPr lang="nl-BE" dirty="0" smtClean="0"/>
+              <a:t>	</a:t>
+            </a:r>
+          </a:p>
+          <a:p>
+            <a:pPr algn="r"/>
+            <a:r>
+              <a:rPr lang="nl-BE" sz="2400" dirty="0" smtClean="0"/>
+              <a:t>Tomas </a:t>
+            </a:r>
+            <a:r>
+              <a:rPr lang="nl-BE" sz="2400" dirty="0" err="1" smtClean="0"/>
+              <a:t>Bolckmans</a:t>
+            </a:r>
+            <a:endParaRPr lang="nl-BE" sz="2400" dirty="0" smtClean="0"/>
+          </a:p>
+          <a:p>
+            <a:pPr algn="r"/>
+            <a:r>
+              <a:rPr lang="nl-BE" sz="2400" dirty="0" smtClean="0"/>
+              <a:t>Thomas </a:t>
+            </a:r>
+            <a:r>
+              <a:rPr lang="nl-BE" sz="2400" dirty="0" err="1" smtClean="0"/>
+              <a:t>Clauwaert</a:t>
+            </a:r>
+            <a:endParaRPr lang="nl-BE" sz="2400" dirty="0" smtClean="0"/>
+          </a:p>
+          <a:p>
+            <a:pPr algn="r"/>
+            <a:r>
+              <a:rPr lang="nl-BE" sz="2400" dirty="0" smtClean="0"/>
+              <a:t>Aaron </a:t>
+            </a:r>
+            <a:r>
+              <a:rPr lang="nl-BE" sz="2400" dirty="0" err="1" smtClean="0"/>
+              <a:t>Mousavi</a:t>
+            </a:r>
+            <a:endParaRPr lang="nl-BE" sz="2400" dirty="0" smtClean="0"/>
+          </a:p>
+          <a:p>
+            <a:pPr algn="r"/>
+            <a:r>
+              <a:rPr lang="nl-BE" sz="2400" dirty="0" smtClean="0"/>
+              <a:t>Dwight Kerkhove</a:t>
+            </a:r>
+          </a:p>
+          <a:p>
+            <a:pPr algn="r"/>
+            <a:r>
+              <a:rPr lang="nl-BE" sz="2400" dirty="0" smtClean="0"/>
+              <a:t>Niels Verbeeck</a:t>
+            </a:r>
+            <a:endParaRPr lang="nl-BE" sz="2400" dirty="0"/>
+          </a:p>
+        </p:txBody>
+      </p:sp>
+      <p:sp>
+        <p:nvSpPr>
+          <p:cNvPr id="4" name="TextBox 3"/>
+          <p:cNvSpPr txBox="1"/>
+          <p:nvPr/>
+        </p:nvSpPr>
+        <p:spPr>
+          <a:xfrm>
+            <a:off x="1547664" y="5527591"/>
+            <a:ext cx="2520280" cy="461665"/>
+          </a:xfrm>
+          <a:prstGeom prst="rect">
+            <a:avLst/>
+          </a:prstGeom>
+          <a:noFill/>
+        </p:spPr>
+        <p:txBody>
+          <a:bodyPr wrap="square" rtlCol="0">
+            <a:spAutoFit/>
+          </a:bodyPr>
+          <a:lstStyle/>
+          <a:p>
+            <a:r>
+              <a:rPr lang="nl-BE" sz="2400" dirty="0" smtClean="0">
+                <a:solidFill>
+                  <a:srgbClr val="5F5F5F"/>
+                </a:solidFill>
+              </a:rPr>
+              <a:t>VOP 2015-2016</a:t>
+            </a:r>
+            <a:endParaRPr lang="nl-BE" sz="2400" dirty="0">
+              <a:solidFill>
+                <a:srgbClr val="5F5F5F"/>
+              </a:solidFill>
+            </a:endParaRPr>
           </a:p>
         </p:txBody>
       </p:sp>
@@ -3289,12 +3845,49 @@
       </p:grpSpPr>
       <p:sp>
         <p:nvSpPr>
-          <p:cNvPr id="4" name="Title 3"/>
+          <p:cNvPr id="16" name="Rectangle 15"/>
+          <p:cNvSpPr/>
+          <p:nvPr/>
+        </p:nvSpPr>
+        <p:spPr>
+          <a:xfrm>
+            <a:off x="683568" y="1592062"/>
+            <a:ext cx="4032448" cy="369332"/>
+          </a:xfrm>
+          <a:prstGeom prst="rect">
+            <a:avLst/>
+          </a:prstGeom>
+        </p:spPr>
+        <p:txBody>
+          <a:bodyPr wrap="square">
+            <a:spAutoFit/>
+          </a:bodyPr>
+          <a:lstStyle/>
+          <a:p>
+            <a:r>
+              <a:rPr lang="nl-BE" b="1" dirty="0" smtClean="0"/>
+              <a:t>Huidig </a:t>
+            </a:r>
+            <a:r>
+              <a:rPr lang="nl-BE" b="1" dirty="0" err="1" smtClean="0"/>
+              <a:t>use</a:t>
+            </a:r>
+            <a:r>
+              <a:rPr lang="nl-BE" b="1" dirty="0" smtClean="0"/>
+              <a:t> case diagram</a:t>
+            </a:r>
+            <a:endParaRPr lang="nl-BE" b="1" dirty="0" smtClean="0"/>
+          </a:p>
+        </p:txBody>
+      </p:sp>
+      <p:sp>
+        <p:nvSpPr>
+          <p:cNvPr id="2" name="Slide Number Placeholder 1"/>
           <p:cNvSpPr>
             <a:spLocks noGrp="1"/>
           </p:cNvSpPr>
           <p:nvPr>
-            <p:ph type="title"/>
+            <p:ph type="sldNum" sz="quarter" idx="11"/>
           </p:nvPr>
         </p:nvSpPr>
         <p:spPr/>
@@ -3302,18 +3895,86 @@
           <a:bodyPr/>
           <a:lstStyle/>
           <a:p>
+            <a:fld id="{A28A35A8-C0E1-4C56-AA56-4AA6340DD3FD}" type="slidenum">
+              <a:rPr lang="nl-BE" smtClean="0"/>
+              <a:t>10</a:t>
+            </a:fld>
+            <a:endParaRPr lang="nl-BE"/>
+          </a:p>
+        </p:txBody>
+      </p:sp>
+      <p:sp>
+        <p:nvSpPr>
+          <p:cNvPr id="5" name="TextBox 4"/>
+          <p:cNvSpPr txBox="1"/>
+          <p:nvPr/>
+        </p:nvSpPr>
+        <p:spPr>
+          <a:xfrm>
+            <a:off x="1513072" y="6248400"/>
+            <a:ext cx="7272808" cy="369332"/>
+          </a:xfrm>
+          <a:prstGeom prst="rect">
+            <a:avLst/>
+          </a:prstGeom>
+          <a:noFill/>
+        </p:spPr>
+        <p:txBody>
+          <a:bodyPr wrap="square" rtlCol="0">
+            <a:spAutoFit/>
+          </a:bodyPr>
+          <a:lstStyle/>
+          <a:p>
             <a:r>
               <a:rPr lang="nl-BE" dirty="0" smtClean="0"/>
-              <a:t>Nog op te lossen issues </a:t>
+              <a:t>Waar staan we – Demo – </a:t>
+            </a:r>
+            <a:r>
+              <a:rPr lang="nl-BE" b="1" dirty="0" smtClean="0"/>
+              <a:t>Structuur</a:t>
+            </a:r>
+            <a:r>
+              <a:rPr lang="nl-BE" dirty="0" smtClean="0"/>
+              <a:t> – Issues – Sprint #2 - Vragen</a:t>
             </a:r>
             <a:endParaRPr lang="nl-BE" dirty="0"/>
           </a:p>
         </p:txBody>
       </p:sp>
+      <p:pic>
+        <p:nvPicPr>
+          <p:cNvPr id="4" name="Picture 3"/>
+          <p:cNvPicPr>
+            <a:picLocks noChangeAspect="1"/>
+          </p:cNvPicPr>
+          <p:nvPr/>
+        </p:nvPicPr>
+        <p:blipFill>
+          <a:blip r:embed="rId2">
+            <a:extLst>
+              <a:ext uri="{28A0092B-C50C-407E-A947-70E740481C1C}">
+                <a14:useLocalDpi xmlns:a14="http://schemas.microsoft.com/office/drawing/2010/main" val="0"/>
+              </a:ext>
+            </a:extLst>
+          </a:blip>
+          <a:stretch>
+            <a:fillRect/>
+          </a:stretch>
+        </p:blipFill>
+        <p:spPr>
+          <a:xfrm>
+            <a:off x="1403648" y="2132856"/>
+            <a:ext cx="6845396" cy="3685982"/>
+          </a:xfrm>
+          <a:prstGeom prst="rect">
+            <a:avLst/>
+          </a:prstGeom>
+        </p:spPr>
+      </p:pic>
     </p:spTree>
     <p:extLst>
       <p:ext uri="{BB962C8B-B14F-4D97-AF65-F5344CB8AC3E}">
-        <p14:creationId xmlns:p14="http://schemas.microsoft.com/office/powerpoint/2010/main" val="2104926313"/>
+        <p14:creationId xmlns:p14="http://schemas.microsoft.com/office/powerpoint/2010/main" val="2533443567"/>
       </p:ext>
     </p:extLst>
   </p:cSld>
@@ -3356,7 +4017,7 @@
         <p:spPr>
           <a:xfrm>
             <a:off x="575340" y="2048189"/>
-            <a:ext cx="8064896" cy="1754326"/>
+            <a:ext cx="8064896" cy="4247317"/>
           </a:xfrm>
           <a:prstGeom prst="rect">
             <a:avLst/>
@@ -3375,29 +4036,77 @@
             </a:pPr>
             <a:r>
               <a:rPr lang="nl-BE" dirty="0" smtClean="0"/>
-              <a:t>Trajecten komen niet altijd overeen met gewenste traject</a:t>
-            </a:r>
-            <a:endParaRPr lang="nl-BE" dirty="0" smtClean="0"/>
-          </a:p>
-          <a:p>
-            <a:endParaRPr lang="nl-BE" dirty="0" smtClean="0"/>
+              <a:t>Gebruik van externe perl scripts zonder API key</a:t>
+            </a:r>
           </a:p>
           <a:p>
             <a:pPr marL="285750" indent="-285750">
               <a:buFont typeface="Courier New" pitchFamily="49" charset="0"/>
               <a:buChar char="o"/>
             </a:pPr>
+            <a:endParaRPr lang="nl-BE" dirty="0" smtClean="0"/>
+          </a:p>
+          <a:p>
+            <a:pPr lvl="1"/>
             <a:r>
               <a:rPr lang="nl-BE" dirty="0" smtClean="0"/>
-              <a:t>Gegevens worden niet in UTF-8 opgeslagen</a:t>
-            </a:r>
+              <a:t>+ Gemakkelijk aanpasbaar bij wijzigingen</a:t>
+            </a:r>
+          </a:p>
+          <a:p>
+            <a:pPr marL="742950" lvl="1" indent="-285750">
+              <a:buFont typeface="Courier New" pitchFamily="49" charset="0"/>
+              <a:buChar char="o"/>
+            </a:pPr>
+            <a:endParaRPr lang="nl-BE" dirty="0" smtClean="0"/>
+          </a:p>
+          <a:p>
+            <a:pPr lvl="1"/>
+            <a:r>
+              <a:rPr lang="nl-BE" dirty="0" smtClean="0"/>
+              <a:t>+ Geen API key en bijbehorend contract nodig</a:t>
+            </a:r>
+          </a:p>
+          <a:p>
+            <a:pPr marL="742950" lvl="1" indent="-285750">
+              <a:buFont typeface="Courier New" pitchFamily="49" charset="0"/>
+              <a:buChar char="o"/>
+            </a:pPr>
+            <a:endParaRPr lang="nl-BE" dirty="0" smtClean="0"/>
+          </a:p>
+          <a:p>
+            <a:pPr lvl="1"/>
+            <a:r>
+              <a:rPr lang="nl-BE" dirty="0" smtClean="0"/>
+              <a:t>+ En dus geen limiet</a:t>
+            </a:r>
+          </a:p>
+          <a:p>
+            <a:pPr marL="742950" lvl="1" indent="-285750">
+              <a:buFont typeface="Courier New" pitchFamily="49" charset="0"/>
+              <a:buChar char="o"/>
+            </a:pPr>
+            <a:endParaRPr lang="nl-BE" dirty="0" smtClean="0"/>
+          </a:p>
+          <a:p>
+            <a:pPr lvl="1"/>
+            <a:r>
+              <a:rPr lang="nl-BE" dirty="0" smtClean="0"/>
+              <a:t>- Maakt gebruik via undocumented API/front end website scraping en dus minder stabiel bij wijzigingen</a:t>
+            </a:r>
+          </a:p>
+          <a:p>
+            <a:endParaRPr lang="nl-BE" dirty="0" smtClean="0"/>
           </a:p>
           <a:p>
             <a:pPr marL="285750" indent="-285750">
               <a:buFont typeface="Courier New" pitchFamily="49" charset="0"/>
               <a:buChar char="o"/>
             </a:pPr>
-            <a:endParaRPr lang="nl-BE" dirty="0"/>
+            <a:endParaRPr lang="nl-BE" dirty="0" smtClean="0"/>
+          </a:p>
+          <a:p>
+            <a:endParaRPr lang="nl-BE" dirty="0" smtClean="0"/>
           </a:p>
           <a:p>
             <a:endParaRPr lang="nl-BE" dirty="0" smtClean="0"/>
@@ -3430,16 +4139,76 @@
           <a:p>
             <a:r>
               <a:rPr lang="nl-BE" b="1" dirty="0" smtClean="0"/>
-              <a:t>Issues</a:t>
-            </a:r>
-            <a:endParaRPr lang="nl-BE" b="1" dirty="0" smtClean="0"/>
+              <a:t>Verzamelen van gegevens</a:t>
+            </a:r>
+          </a:p>
+        </p:txBody>
+      </p:sp>
+      <p:sp>
+        <p:nvSpPr>
+          <p:cNvPr id="2" name="Slide Number Placeholder 1"/>
+          <p:cNvSpPr>
+            <a:spLocks noGrp="1"/>
+          </p:cNvSpPr>
+          <p:nvPr>
+            <p:ph type="sldNum" sz="quarter" idx="11"/>
+          </p:nvPr>
+        </p:nvSpPr>
+        <p:spPr/>
+        <p:txBody>
+          <a:bodyPr/>
+          <a:lstStyle/>
+          <a:p>
+            <a:fld id="{A28A35A8-C0E1-4C56-AA56-4AA6340DD3FD}" type="slidenum">
+              <a:rPr lang="nl-BE" smtClean="0"/>
+              <a:t>11</a:t>
+            </a:fld>
+            <a:endParaRPr lang="nl-BE"/>
+          </a:p>
+        </p:txBody>
+      </p:sp>
+      <p:sp>
+        <p:nvSpPr>
+          <p:cNvPr id="5" name="TextBox 4"/>
+          <p:cNvSpPr txBox="1"/>
+          <p:nvPr/>
+        </p:nvSpPr>
+        <p:spPr>
+          <a:xfrm>
+            <a:off x="1513072" y="6248400"/>
+            <a:ext cx="7272808" cy="369332"/>
+          </a:xfrm>
+          <a:prstGeom prst="rect">
+            <a:avLst/>
+          </a:prstGeom>
+          <a:noFill/>
+        </p:spPr>
+        <p:txBody>
+          <a:bodyPr wrap="square" rtlCol="0">
+            <a:spAutoFit/>
+          </a:bodyPr>
+          <a:lstStyle/>
+          <a:p>
+            <a:r>
+              <a:rPr lang="nl-BE" dirty="0" smtClean="0"/>
+              <a:t>Waar staan we – Demo – </a:t>
+            </a:r>
+            <a:r>
+              <a:rPr lang="nl-BE" b="1" dirty="0" smtClean="0"/>
+              <a:t>Structuur</a:t>
+            </a:r>
+            <a:r>
+              <a:rPr lang="nl-BE" dirty="0" smtClean="0"/>
+              <a:t> – Issues – Sprint #2 - Vragen</a:t>
+            </a:r>
+            <a:endParaRPr lang="nl-BE" dirty="0"/>
           </a:p>
         </p:txBody>
       </p:sp>
     </p:spTree>
     <p:extLst>
       <p:ext uri="{BB962C8B-B14F-4D97-AF65-F5344CB8AC3E}">
-        <p14:creationId xmlns:p14="http://schemas.microsoft.com/office/powerpoint/2010/main" val="3932174385"/>
+        <p14:creationId xmlns:p14="http://schemas.microsoft.com/office/powerpoint/2010/main" val="3320250108"/>
       </p:ext>
     </p:extLst>
   </p:cSld>
@@ -3475,12 +4244,135 @@
       </p:grpSpPr>
       <p:sp>
         <p:nvSpPr>
-          <p:cNvPr id="4" name="Title 3"/>
+          <p:cNvPr id="15" name="TextBox 14"/>
+          <p:cNvSpPr txBox="1"/>
+          <p:nvPr/>
+        </p:nvSpPr>
+        <p:spPr>
+          <a:xfrm>
+            <a:off x="575340" y="2048189"/>
+            <a:ext cx="8064896" cy="3693319"/>
+          </a:xfrm>
+          <a:prstGeom prst="rect">
+            <a:avLst/>
+          </a:prstGeom>
+          <a:noFill/>
+        </p:spPr>
+        <p:txBody>
+          <a:bodyPr wrap="square" rtlCol="0">
+            <a:spAutoFit/>
+          </a:bodyPr>
+          <a:lstStyle/>
+          <a:p>
+            <a:pPr marL="285750" indent="-285750">
+              <a:buFont typeface="Courier New" pitchFamily="49" charset="0"/>
+              <a:buChar char="o"/>
+            </a:pPr>
+            <a:r>
+              <a:rPr lang="nl-BE" dirty="0" smtClean="0"/>
+              <a:t>Fallback naar API met verkregen API key</a:t>
+            </a:r>
+          </a:p>
+          <a:p>
+            <a:pPr marL="285750" indent="-285750">
+              <a:buFont typeface="Courier New" pitchFamily="49" charset="0"/>
+              <a:buChar char="o"/>
+            </a:pPr>
+            <a:endParaRPr lang="nl-BE" dirty="0" smtClean="0"/>
+          </a:p>
+          <a:p>
+            <a:pPr lvl="1"/>
+            <a:r>
+              <a:rPr lang="nl-BE" dirty="0" smtClean="0"/>
+              <a:t>+ Zorgt ervoor dat er geen gaten in de gegevens komen</a:t>
+            </a:r>
+          </a:p>
+          <a:p>
+            <a:pPr marL="742950" lvl="1" indent="-285750">
+              <a:buFont typeface="Courier New" pitchFamily="49" charset="0"/>
+              <a:buChar char="o"/>
+            </a:pPr>
+            <a:endParaRPr lang="nl-BE" dirty="0" smtClean="0"/>
+          </a:p>
+          <a:p>
+            <a:pPr lvl="1"/>
+            <a:r>
+              <a:rPr lang="nl-BE" dirty="0" smtClean="0"/>
+              <a:t>+ Gebruikt enkel API key wanneer scrapen mislukt</a:t>
+            </a:r>
+          </a:p>
+          <a:p>
+            <a:pPr lvl="1"/>
+            <a:endParaRPr lang="nl-BE" dirty="0" smtClean="0"/>
+          </a:p>
+          <a:p>
+            <a:pPr lvl="1"/>
+            <a:r>
+              <a:rPr lang="nl-BE" dirty="0" smtClean="0"/>
+              <a:t>- API key licentie nodig</a:t>
+            </a:r>
+          </a:p>
+          <a:p>
+            <a:pPr lvl="1"/>
+            <a:endParaRPr lang="nl-BE" dirty="0" smtClean="0"/>
+          </a:p>
+          <a:p>
+            <a:endParaRPr lang="nl-BE" dirty="0" smtClean="0"/>
+          </a:p>
+          <a:p>
+            <a:pPr marL="285750" indent="-285750">
+              <a:buFont typeface="Courier New" pitchFamily="49" charset="0"/>
+              <a:buChar char="o"/>
+            </a:pPr>
+            <a:endParaRPr lang="nl-BE" dirty="0" smtClean="0"/>
+          </a:p>
+          <a:p>
+            <a:endParaRPr lang="nl-BE" dirty="0" smtClean="0"/>
+          </a:p>
+          <a:p>
+            <a:endParaRPr lang="nl-BE" dirty="0" smtClean="0"/>
+          </a:p>
+          <a:p>
+            <a:endParaRPr lang="nl-BE" dirty="0"/>
+          </a:p>
+        </p:txBody>
+      </p:sp>
+      <p:sp>
+        <p:nvSpPr>
+          <p:cNvPr id="16" name="Rectangle 15"/>
+          <p:cNvSpPr/>
+          <p:nvPr/>
+        </p:nvSpPr>
+        <p:spPr>
+          <a:xfrm>
+            <a:off x="683568" y="1592062"/>
+            <a:ext cx="4032448" cy="369332"/>
+          </a:xfrm>
+          <a:prstGeom prst="rect">
+            <a:avLst/>
+          </a:prstGeom>
+        </p:spPr>
+        <p:txBody>
+          <a:bodyPr wrap="square">
+            <a:spAutoFit/>
+          </a:bodyPr>
+          <a:lstStyle/>
+          <a:p>
+            <a:r>
+              <a:rPr lang="nl-BE" b="1" dirty="0" smtClean="0"/>
+              <a:t>Verzamelen van gegevens</a:t>
+            </a:r>
+          </a:p>
+        </p:txBody>
+      </p:sp>
+      <p:sp>
+        <p:nvSpPr>
+          <p:cNvPr id="2" name="Slide Number Placeholder 1"/>
           <p:cNvSpPr>
             <a:spLocks noGrp="1"/>
           </p:cNvSpPr>
           <p:nvPr>
-            <p:ph type="title"/>
+            <p:ph type="sldNum" sz="quarter" idx="11"/>
           </p:nvPr>
         </p:nvSpPr>
         <p:spPr/>
@@ -3488,9 +4380,47 @@
           <a:bodyPr/>
           <a:lstStyle/>
           <a:p>
+            <a:fld id="{A28A35A8-C0E1-4C56-AA56-4AA6340DD3FD}" type="slidenum">
+              <a:rPr lang="nl-BE" smtClean="0"/>
+              <a:t>12</a:t>
+            </a:fld>
+            <a:endParaRPr lang="nl-BE"/>
+          </a:p>
+        </p:txBody>
+      </p:sp>
+      <p:sp>
+        <p:nvSpPr>
+          <p:cNvPr id="5" name="TextBox 4"/>
+          <p:cNvSpPr txBox="1"/>
+          <p:nvPr/>
+        </p:nvSpPr>
+        <p:spPr>
+          <a:xfrm>
+            <a:off x="1513072" y="6248400"/>
+            <a:ext cx="7272808" cy="369332"/>
+          </a:xfrm>
+          <a:prstGeom prst="rect">
+            <a:avLst/>
+          </a:prstGeom>
+          <a:noFill/>
+        </p:spPr>
+        <p:txBody>
+          <a:bodyPr wrap="square" rtlCol="0">
+            <a:spAutoFit/>
+          </a:bodyPr>
+          <a:lstStyle/>
+          <a:p>
             <a:r>
               <a:rPr lang="nl-BE" dirty="0" smtClean="0"/>
-              <a:t>Targets voor sprint #2</a:t>
+              <a:t>Waar staan we – Demo – </a:t>
+            </a:r>
+            <a:r>
+              <a:rPr lang="nl-BE" b="1" dirty="0" smtClean="0"/>
+              <a:t>Structuur</a:t>
+            </a:r>
+            <a:r>
+              <a:rPr lang="nl-BE" dirty="0" smtClean="0"/>
+              <a:t> – Issues – Sprint #2 - Vragen</a:t>
             </a:r>
             <a:endParaRPr lang="nl-BE" dirty="0"/>
           </a:p>
@@ -3499,7 +4429,7 @@
     </p:spTree>
     <p:extLst>
       <p:ext uri="{BB962C8B-B14F-4D97-AF65-F5344CB8AC3E}">
-        <p14:creationId xmlns:p14="http://schemas.microsoft.com/office/powerpoint/2010/main" val="5537510"/>
+        <p14:creationId xmlns:p14="http://schemas.microsoft.com/office/powerpoint/2010/main" val="1434016546"/>
       </p:ext>
     </p:extLst>
   </p:cSld>
@@ -3535,14 +4465,60 @@
       </p:grpSpPr>
       <p:sp>
         <p:nvSpPr>
-          <p:cNvPr id="15" name="TextBox 14"/>
+          <p:cNvPr id="4" name="Title 3"/>
+          <p:cNvSpPr>
+            <a:spLocks noGrp="1"/>
+          </p:cNvSpPr>
+          <p:nvPr>
+            <p:ph type="title"/>
+          </p:nvPr>
+        </p:nvSpPr>
+        <p:spPr/>
+        <p:txBody>
+          <a:bodyPr/>
+          <a:lstStyle/>
+          <a:p>
+            <a:r>
+              <a:rPr lang="nl-BE" dirty="0" smtClean="0"/>
+              <a:t>Nog op te lossen issues </a:t>
+            </a:r>
+            <a:endParaRPr lang="nl-BE" dirty="0"/>
+          </a:p>
+        </p:txBody>
+      </p:sp>
+      <p:sp>
+        <p:nvSpPr>
+          <p:cNvPr id="2" name="Slide Number Placeholder 1"/>
+          <p:cNvSpPr>
+            <a:spLocks noGrp="1"/>
+          </p:cNvSpPr>
+          <p:nvPr>
+            <p:ph type="sldNum" sz="quarter" idx="11"/>
+          </p:nvPr>
+        </p:nvSpPr>
+        <p:spPr/>
+        <p:txBody>
+          <a:bodyPr/>
+          <a:lstStyle/>
+          <a:p>
+            <a:fld id="{A28A35A8-C0E1-4C56-AA56-4AA6340DD3FD}" type="slidenum">
+              <a:rPr lang="nl-BE" smtClean="0"/>
+              <a:t>13</a:t>
+            </a:fld>
+            <a:endParaRPr lang="nl-BE"/>
+          </a:p>
+        </p:txBody>
+      </p:sp>
+      <p:sp>
+        <p:nvSpPr>
+          <p:cNvPr id="5" name="TextBox 4"/>
           <p:cNvSpPr txBox="1"/>
           <p:nvPr/>
         </p:nvSpPr>
         <p:spPr>
           <a:xfrm>
-            <a:off x="575340" y="2048189"/>
-            <a:ext cx="8064896" cy="2585323"/>
+            <a:off x="1513072" y="6248400"/>
+            <a:ext cx="7272808" cy="369332"/>
           </a:xfrm>
           <a:prstGeom prst="rect">
             <a:avLst/>
@@ -3555,104 +4531,26 @@
           </a:bodyPr>
           <a:lstStyle/>
           <a:p>
-            <a:pPr marL="285750" indent="-285750">
-              <a:buFont typeface="Courier New" pitchFamily="49" charset="0"/>
-              <a:buChar char="o"/>
-            </a:pPr>
             <a:r>
               <a:rPr lang="nl-BE" dirty="0" smtClean="0"/>
-              <a:t>Resterende issues oplossen &amp; feedback verwerken</a:t>
-            </a:r>
-          </a:p>
-          <a:p>
-            <a:pPr marL="285750" indent="-285750">
-              <a:buFont typeface="Courier New" pitchFamily="49" charset="0"/>
-              <a:buChar char="o"/>
-            </a:pPr>
-            <a:endParaRPr lang="nl-BE" dirty="0" smtClean="0"/>
-          </a:p>
-          <a:p>
-            <a:pPr marL="285750" indent="-285750">
-              <a:buFont typeface="Courier New" pitchFamily="49" charset="0"/>
-              <a:buChar char="o"/>
-            </a:pPr>
+              <a:t>Waar staan we – Demo – Structuur – </a:t>
+            </a:r>
+            <a:r>
+              <a:rPr lang="nl-BE" b="1" dirty="0" smtClean="0"/>
+              <a:t>Issues</a:t>
+            </a:r>
             <a:r>
               <a:rPr lang="nl-BE" dirty="0" smtClean="0"/>
-              <a:t>Betrouwbaarheidsfactor</a:t>
-            </a:r>
-          </a:p>
-          <a:p>
-            <a:pPr marL="285750" indent="-285750">
-              <a:buFont typeface="Courier New" pitchFamily="49" charset="0"/>
-              <a:buChar char="o"/>
-            </a:pPr>
-            <a:endParaRPr lang="nl-BE" dirty="0" smtClean="0"/>
-          </a:p>
-          <a:p>
-            <a:pPr marL="285750" indent="-285750">
-              <a:buFont typeface="Courier New" pitchFamily="49" charset="0"/>
-              <a:buChar char="o"/>
-            </a:pPr>
-            <a:r>
-              <a:rPr lang="nl-BE" dirty="0" smtClean="0"/>
-              <a:t>POI gegevens verzamelen (ongevallen, wegenwerken, afgesloten rijvakken,...)</a:t>
-            </a:r>
-          </a:p>
-          <a:p>
-            <a:endParaRPr lang="nl-BE" dirty="0" smtClean="0"/>
-          </a:p>
-          <a:p>
-            <a:pPr marL="285750" indent="-285750">
-              <a:buFont typeface="Courier New" pitchFamily="49" charset="0"/>
-              <a:buChar char="o"/>
-            </a:pPr>
-            <a:r>
-              <a:rPr lang="nl-BE" dirty="0" smtClean="0"/>
-              <a:t>Error handling &amp; logging</a:t>
-            </a:r>
-          </a:p>
-          <a:p>
-            <a:pPr marL="285750" indent="-285750">
-              <a:buFont typeface="Courier New" pitchFamily="49" charset="0"/>
-              <a:buChar char="o"/>
-            </a:pPr>
-            <a:endParaRPr lang="nl-BE" dirty="0" smtClean="0"/>
-          </a:p>
-        </p:txBody>
-      </p:sp>
-      <p:sp>
-        <p:nvSpPr>
-          <p:cNvPr id="16" name="Rectangle 15"/>
-          <p:cNvSpPr/>
-          <p:nvPr/>
-        </p:nvSpPr>
-        <p:spPr>
-          <a:xfrm>
-            <a:off x="683568" y="1592062"/>
-            <a:ext cx="4032448" cy="369332"/>
-          </a:xfrm>
-          <a:prstGeom prst="rect">
-            <a:avLst/>
-          </a:prstGeom>
-        </p:spPr>
-        <p:txBody>
-          <a:bodyPr wrap="square">
-            <a:spAutoFit/>
-          </a:bodyPr>
-          <a:lstStyle/>
-          <a:p>
-            <a:r>
-              <a:rPr lang="nl-BE" b="1" dirty="0" smtClean="0"/>
-              <a:t>Targets sprint #2</a:t>
-            </a:r>
-            <a:endParaRPr lang="nl-BE" b="1" dirty="0" smtClean="0"/>
+              <a:t> – Sprint #2 - Vragen</a:t>
+            </a:r>
+            <a:endParaRPr lang="nl-BE" dirty="0"/>
           </a:p>
         </p:txBody>
       </p:sp>
     </p:spTree>
     <p:extLst>
       <p:ext uri="{BB962C8B-B14F-4D97-AF65-F5344CB8AC3E}">
-        <p14:creationId xmlns:p14="http://schemas.microsoft.com/office/powerpoint/2010/main" val="4102220416"/>
+        <p14:creationId xmlns:p14="http://schemas.microsoft.com/office/powerpoint/2010/main" val="2104926313"/>
       </p:ext>
     </p:extLst>
   </p:cSld>
@@ -3695,7 +4593,7 @@
         <p:spPr>
           <a:xfrm>
             <a:off x="575340" y="2048189"/>
-            <a:ext cx="8064896" cy="2031325"/>
+            <a:ext cx="8064896" cy="2308324"/>
           </a:xfrm>
           <a:prstGeom prst="rect">
             <a:avLst/>
@@ -3714,7 +4612,24 @@
             </a:pPr>
             <a:r>
               <a:rPr lang="nl-BE" dirty="0" smtClean="0"/>
-              <a:t>Weer &amp; Parkingsgegevens verzamelen</a:t>
+              <a:t>Trajecten komen niet altijd overeen met gewenste traject</a:t>
+            </a:r>
+          </a:p>
+          <a:p>
+            <a:endParaRPr lang="nl-BE" dirty="0" smtClean="0"/>
+          </a:p>
+          <a:p>
+            <a:pPr marL="285750" indent="-285750">
+              <a:buFont typeface="Courier New" pitchFamily="49" charset="0"/>
+              <a:buChar char="o"/>
+            </a:pPr>
+            <a:r>
+              <a:rPr lang="nl-BE" dirty="0" smtClean="0"/>
+              <a:t>Gegevens worden niet in UTF-8 </a:t>
+            </a:r>
+            <a:r>
+              <a:rPr lang="nl-BE" dirty="0" smtClean="0"/>
+              <a:t>opgeslagen</a:t>
             </a:r>
           </a:p>
           <a:p>
@@ -3731,8 +4646,9 @@
             </a:pPr>
             <a:r>
               <a:rPr lang="nl-BE" dirty="0" smtClean="0"/>
-              <a:t>REST service voor route gegevens</a:t>
-            </a:r>
+              <a:t>Productieomgeving</a:t>
+            </a:r>
+            <a:endParaRPr lang="nl-BE" dirty="0" smtClean="0"/>
           </a:p>
           <a:p>
             <a:pPr marL="285750" indent="-285750">
@@ -3742,31 +4658,10 @@
             <a:endParaRPr lang="nl-BE" dirty="0"/>
           </a:p>
           <a:p>
-            <a:pPr marL="285750" indent="-285750">
-              <a:buFont typeface="Courier New" pitchFamily="49" charset="0"/>
-              <a:buChar char="o"/>
-            </a:pPr>
-            <a:r>
-              <a:rPr lang="nl-BE" dirty="0" smtClean="0"/>
-              <a:t>Twitter integratie</a:t>
-            </a:r>
-          </a:p>
-          <a:p>
-            <a:pPr marL="285750" indent="-285750">
-              <a:buFont typeface="Courier New" pitchFamily="49" charset="0"/>
-              <a:buChar char="o"/>
-            </a:pPr>
             <a:endParaRPr lang="nl-BE" dirty="0" smtClean="0"/>
           </a:p>
           <a:p>
-            <a:pPr marL="285750" indent="-285750">
-              <a:buFont typeface="Courier New" pitchFamily="49" charset="0"/>
-              <a:buChar char="o"/>
-            </a:pPr>
-            <a:r>
-              <a:rPr lang="nl-BE" dirty="0" smtClean="0"/>
-              <a:t>Dashboard</a:t>
-            </a:r>
+            <a:endParaRPr lang="nl-BE" dirty="0"/>
           </a:p>
         </p:txBody>
       </p:sp>
@@ -3793,16 +4688,76 @@
           <a:p>
             <a:r>
               <a:rPr lang="nl-BE" b="1" dirty="0" smtClean="0"/>
-              <a:t>Product backlog</a:t>
-            </a:r>
-            <a:endParaRPr lang="nl-BE" b="1" dirty="0" smtClean="0"/>
+              <a:t>Issues</a:t>
+            </a:r>
+          </a:p>
+        </p:txBody>
+      </p:sp>
+      <p:sp>
+        <p:nvSpPr>
+          <p:cNvPr id="2" name="Slide Number Placeholder 1"/>
+          <p:cNvSpPr>
+            <a:spLocks noGrp="1"/>
+          </p:cNvSpPr>
+          <p:nvPr>
+            <p:ph type="sldNum" sz="quarter" idx="11"/>
+          </p:nvPr>
+        </p:nvSpPr>
+        <p:spPr/>
+        <p:txBody>
+          <a:bodyPr/>
+          <a:lstStyle/>
+          <a:p>
+            <a:fld id="{A28A35A8-C0E1-4C56-AA56-4AA6340DD3FD}" type="slidenum">
+              <a:rPr lang="nl-BE" smtClean="0"/>
+              <a:t>14</a:t>
+            </a:fld>
+            <a:endParaRPr lang="nl-BE"/>
+          </a:p>
+        </p:txBody>
+      </p:sp>
+      <p:sp>
+        <p:nvSpPr>
+          <p:cNvPr id="5" name="TextBox 4"/>
+          <p:cNvSpPr txBox="1"/>
+          <p:nvPr/>
+        </p:nvSpPr>
+        <p:spPr>
+          <a:xfrm>
+            <a:off x="1513072" y="6248400"/>
+            <a:ext cx="7272808" cy="369332"/>
+          </a:xfrm>
+          <a:prstGeom prst="rect">
+            <a:avLst/>
+          </a:prstGeom>
+          <a:noFill/>
+        </p:spPr>
+        <p:txBody>
+          <a:bodyPr wrap="square" rtlCol="0">
+            <a:spAutoFit/>
+          </a:bodyPr>
+          <a:lstStyle/>
+          <a:p>
+            <a:r>
+              <a:rPr lang="nl-BE" dirty="0" smtClean="0"/>
+              <a:t>Waar staan we – Demo – Structuur – </a:t>
+            </a:r>
+            <a:r>
+              <a:rPr lang="nl-BE" b="1" dirty="0" smtClean="0"/>
+              <a:t>Issues</a:t>
+            </a:r>
+            <a:r>
+              <a:rPr lang="nl-BE" dirty="0" smtClean="0"/>
+              <a:t> – Sprint #2 - Vragen</a:t>
+            </a:r>
+            <a:endParaRPr lang="nl-BE" dirty="0"/>
           </a:p>
         </p:txBody>
       </p:sp>
     </p:spTree>
     <p:extLst>
       <p:ext uri="{BB962C8B-B14F-4D97-AF65-F5344CB8AC3E}">
-        <p14:creationId xmlns:p14="http://schemas.microsoft.com/office/powerpoint/2010/main" val="1405050281"/>
+        <p14:creationId xmlns:p14="http://schemas.microsoft.com/office/powerpoint/2010/main" val="3932174385"/>
       </p:ext>
     </p:extLst>
   </p:cSld>
@@ -3853,9 +4808,861 @@
           <a:p>
             <a:r>
               <a:rPr lang="nl-BE" dirty="0" smtClean="0"/>
+              <a:t>Targets voor sprint #2</a:t>
+            </a:r>
+            <a:endParaRPr lang="nl-BE" dirty="0"/>
+          </a:p>
+        </p:txBody>
+      </p:sp>
+      <p:sp>
+        <p:nvSpPr>
+          <p:cNvPr id="2" name="Slide Number Placeholder 1"/>
+          <p:cNvSpPr>
+            <a:spLocks noGrp="1"/>
+          </p:cNvSpPr>
+          <p:nvPr>
+            <p:ph type="sldNum" sz="quarter" idx="11"/>
+          </p:nvPr>
+        </p:nvSpPr>
+        <p:spPr/>
+        <p:txBody>
+          <a:bodyPr/>
+          <a:lstStyle/>
+          <a:p>
+            <a:fld id="{A28A35A8-C0E1-4C56-AA56-4AA6340DD3FD}" type="slidenum">
+              <a:rPr lang="nl-BE" smtClean="0"/>
+              <a:t>15</a:t>
+            </a:fld>
+            <a:endParaRPr lang="nl-BE"/>
+          </a:p>
+        </p:txBody>
+      </p:sp>
+      <p:sp>
+        <p:nvSpPr>
+          <p:cNvPr id="5" name="TextBox 4"/>
+          <p:cNvSpPr txBox="1"/>
+          <p:nvPr/>
+        </p:nvSpPr>
+        <p:spPr>
+          <a:xfrm>
+            <a:off x="1513072" y="6248400"/>
+            <a:ext cx="7272808" cy="369332"/>
+          </a:xfrm>
+          <a:prstGeom prst="rect">
+            <a:avLst/>
+          </a:prstGeom>
+          <a:noFill/>
+        </p:spPr>
+        <p:txBody>
+          <a:bodyPr wrap="square" rtlCol="0">
+            <a:spAutoFit/>
+          </a:bodyPr>
+          <a:lstStyle/>
+          <a:p>
+            <a:r>
+              <a:rPr lang="nl-BE" dirty="0" smtClean="0"/>
+              <a:t>Waar staan we – Demo – Structuur – Issues – </a:t>
+            </a:r>
+            <a:r>
+              <a:rPr lang="nl-BE" b="1" dirty="0" smtClean="0"/>
+              <a:t>Sprint #2</a:t>
+            </a:r>
+            <a:r>
+              <a:rPr lang="nl-BE" dirty="0" smtClean="0"/>
+              <a:t> - Vragen</a:t>
+            </a:r>
+            <a:endParaRPr lang="nl-BE" dirty="0"/>
+          </a:p>
+        </p:txBody>
+      </p:sp>
+    </p:spTree>
+    <p:extLst>
+      <p:ext uri="{BB962C8B-B14F-4D97-AF65-F5344CB8AC3E}">
+        <p14:creationId xmlns:p14="http://schemas.microsoft.com/office/powerpoint/2010/main" val="5537510"/>
+      </p:ext>
+    </p:extLst>
+  </p:cSld>
+  <p:clrMapOvr>
+    <a:masterClrMapping/>
+  </p:clrMapOvr>
+  <p:timing>
+    <p:tnLst>
+      <p:par>
+        <p:cTn id="1" dur="indefinite" restart="never" nodeType="tmRoot"/>
+      </p:par>
+    </p:tnLst>
+  </p:timing>
+</p:sld>
+</file>
+
+<file path=ppt/slides/slide16.xml><?xml version="1.0" encoding="utf-8"?>
+<p:sld xmlns:a="http://schemas.openxmlformats.org/drawingml/2006/main" xmlns:r="http://schemas.openxmlformats.org/officeDocument/2006/relationships" xmlns:p="http://schemas.openxmlformats.org/presentationml/2006/main">
+  <p:cSld>
+    <p:spTree>
+      <p:nvGrpSpPr>
+        <p:cNvPr id="1" name=""/>
+        <p:cNvGrpSpPr/>
+        <p:nvPr/>
+      </p:nvGrpSpPr>
+      <p:grpSpPr>
+        <a:xfrm>
+          <a:off x="0" y="0"/>
+          <a:ext cx="0" cy="0"/>
+          <a:chOff x="0" y="0"/>
+          <a:chExt cx="0" cy="0"/>
+        </a:xfrm>
+      </p:grpSpPr>
+      <p:sp>
+        <p:nvSpPr>
+          <p:cNvPr id="15" name="TextBox 14"/>
+          <p:cNvSpPr txBox="1"/>
+          <p:nvPr/>
+        </p:nvSpPr>
+        <p:spPr>
+          <a:xfrm>
+            <a:off x="575340" y="2048189"/>
+            <a:ext cx="8064896" cy="3693319"/>
+          </a:xfrm>
+          <a:prstGeom prst="rect">
+            <a:avLst/>
+          </a:prstGeom>
+          <a:noFill/>
+        </p:spPr>
+        <p:txBody>
+          <a:bodyPr wrap="square" rtlCol="0">
+            <a:spAutoFit/>
+          </a:bodyPr>
+          <a:lstStyle/>
+          <a:p>
+            <a:pPr marL="285750" indent="-285750">
+              <a:buFont typeface="Courier New" pitchFamily="49" charset="0"/>
+              <a:buChar char="o"/>
+            </a:pPr>
+            <a:r>
+              <a:rPr lang="nl-BE" dirty="0" smtClean="0"/>
+              <a:t>Resterende issues oplossen &amp; feedback verwerken</a:t>
+            </a:r>
+          </a:p>
+          <a:p>
+            <a:pPr marL="285750" indent="-285750">
+              <a:buFont typeface="Courier New" pitchFamily="49" charset="0"/>
+              <a:buChar char="o"/>
+            </a:pPr>
+            <a:endParaRPr lang="nl-BE" dirty="0" smtClean="0"/>
+          </a:p>
+          <a:p>
+            <a:pPr marL="285750" indent="-285750">
+              <a:buFont typeface="Courier New" pitchFamily="49" charset="0"/>
+              <a:buChar char="o"/>
+            </a:pPr>
+            <a:r>
+              <a:rPr lang="nl-BE" dirty="0" smtClean="0"/>
+              <a:t>Betrouwbaarheidsfactor</a:t>
+            </a:r>
+          </a:p>
+          <a:p>
+            <a:pPr marL="285750" indent="-285750">
+              <a:buFont typeface="Courier New" pitchFamily="49" charset="0"/>
+              <a:buChar char="o"/>
+            </a:pPr>
+            <a:endParaRPr lang="nl-BE" dirty="0" smtClean="0"/>
+          </a:p>
+          <a:p>
+            <a:pPr marL="285750" indent="-285750">
+              <a:buFont typeface="Courier New" pitchFamily="49" charset="0"/>
+              <a:buChar char="o"/>
+            </a:pPr>
+            <a:r>
+              <a:rPr lang="nl-BE" dirty="0" smtClean="0"/>
+              <a:t>POI gegevens verzamelen (ongevallen, wegenwerken, afgesloten rijvakken,...)</a:t>
+            </a:r>
+          </a:p>
+          <a:p>
+            <a:endParaRPr lang="nl-BE" dirty="0" smtClean="0"/>
+          </a:p>
+          <a:p>
+            <a:pPr marL="285750" indent="-285750">
+              <a:buFont typeface="Courier New" pitchFamily="49" charset="0"/>
+              <a:buChar char="o"/>
+            </a:pPr>
+            <a:r>
+              <a:rPr lang="nl-BE" dirty="0" smtClean="0"/>
+              <a:t>Error handling &amp; </a:t>
+            </a:r>
+            <a:r>
+              <a:rPr lang="nl-BE" dirty="0" err="1" smtClean="0"/>
+              <a:t>logging</a:t>
+            </a:r>
+            <a:r>
+              <a:rPr lang="nl-BE" dirty="0" smtClean="0"/>
+              <a:t> </a:t>
+            </a:r>
+          </a:p>
+          <a:p>
+            <a:pPr marL="285750" indent="-285750">
+              <a:buFont typeface="Courier New" pitchFamily="49" charset="0"/>
+              <a:buChar char="o"/>
+            </a:pPr>
+            <a:endParaRPr lang="nl-BE" dirty="0" smtClean="0"/>
+          </a:p>
+          <a:p>
+            <a:pPr marL="285750" indent="-285750">
+              <a:buFont typeface="Courier New" pitchFamily="49" charset="0"/>
+              <a:buChar char="o"/>
+            </a:pPr>
+            <a:r>
+              <a:rPr lang="nl-BE" dirty="0" smtClean="0"/>
+              <a:t>Unit Tests</a:t>
+            </a:r>
+          </a:p>
+          <a:p>
+            <a:pPr marL="285750" indent="-285750">
+              <a:buFont typeface="Courier New" pitchFamily="49" charset="0"/>
+              <a:buChar char="o"/>
+            </a:pPr>
+            <a:endParaRPr lang="nl-BE" dirty="0" smtClean="0"/>
+          </a:p>
+          <a:p>
+            <a:pPr marL="285750" indent="-285750">
+              <a:buFont typeface="Courier New" pitchFamily="49" charset="0"/>
+              <a:buChar char="o"/>
+            </a:pPr>
+            <a:r>
+              <a:rPr lang="nl-BE" dirty="0" smtClean="0"/>
+              <a:t>Integration Tests</a:t>
+            </a:r>
+            <a:endParaRPr lang="nl-BE" dirty="0" smtClean="0"/>
+          </a:p>
+          <a:p>
+            <a:pPr marL="285750" indent="-285750">
+              <a:buFont typeface="Courier New" pitchFamily="49" charset="0"/>
+              <a:buChar char="o"/>
+            </a:pPr>
+            <a:endParaRPr lang="nl-BE" dirty="0" smtClean="0"/>
+          </a:p>
+        </p:txBody>
+      </p:sp>
+      <p:sp>
+        <p:nvSpPr>
+          <p:cNvPr id="16" name="Rectangle 15"/>
+          <p:cNvSpPr/>
+          <p:nvPr/>
+        </p:nvSpPr>
+        <p:spPr>
+          <a:xfrm>
+            <a:off x="683568" y="1592062"/>
+            <a:ext cx="4032448" cy="369332"/>
+          </a:xfrm>
+          <a:prstGeom prst="rect">
+            <a:avLst/>
+          </a:prstGeom>
+        </p:spPr>
+        <p:txBody>
+          <a:bodyPr wrap="square">
+            <a:spAutoFit/>
+          </a:bodyPr>
+          <a:lstStyle/>
+          <a:p>
+            <a:r>
+              <a:rPr lang="nl-BE" b="1" dirty="0" smtClean="0"/>
+              <a:t>Targets sprint #2</a:t>
+            </a:r>
+          </a:p>
+        </p:txBody>
+      </p:sp>
+      <p:sp>
+        <p:nvSpPr>
+          <p:cNvPr id="2" name="Slide Number Placeholder 1"/>
+          <p:cNvSpPr>
+            <a:spLocks noGrp="1"/>
+          </p:cNvSpPr>
+          <p:nvPr>
+            <p:ph type="sldNum" sz="quarter" idx="11"/>
+          </p:nvPr>
+        </p:nvSpPr>
+        <p:spPr/>
+        <p:txBody>
+          <a:bodyPr/>
+          <a:lstStyle/>
+          <a:p>
+            <a:fld id="{A28A35A8-C0E1-4C56-AA56-4AA6340DD3FD}" type="slidenum">
+              <a:rPr lang="nl-BE" smtClean="0"/>
+              <a:t>16</a:t>
+            </a:fld>
+            <a:endParaRPr lang="nl-BE"/>
+          </a:p>
+        </p:txBody>
+      </p:sp>
+      <p:sp>
+        <p:nvSpPr>
+          <p:cNvPr id="5" name="TextBox 4"/>
+          <p:cNvSpPr txBox="1"/>
+          <p:nvPr/>
+        </p:nvSpPr>
+        <p:spPr>
+          <a:xfrm>
+            <a:off x="1513072" y="6248400"/>
+            <a:ext cx="7272808" cy="369332"/>
+          </a:xfrm>
+          <a:prstGeom prst="rect">
+            <a:avLst/>
+          </a:prstGeom>
+          <a:noFill/>
+        </p:spPr>
+        <p:txBody>
+          <a:bodyPr wrap="square" rtlCol="0">
+            <a:spAutoFit/>
+          </a:bodyPr>
+          <a:lstStyle/>
+          <a:p>
+            <a:r>
+              <a:rPr lang="nl-BE" dirty="0" smtClean="0"/>
+              <a:t>Waar staan we – Demo – Structuur – Issues – </a:t>
+            </a:r>
+            <a:r>
+              <a:rPr lang="nl-BE" b="1" dirty="0" smtClean="0"/>
+              <a:t>Sprint #2</a:t>
+            </a:r>
+            <a:r>
+              <a:rPr lang="nl-BE" dirty="0" smtClean="0"/>
+              <a:t> - Vragen</a:t>
+            </a:r>
+            <a:endParaRPr lang="nl-BE" dirty="0"/>
+          </a:p>
+        </p:txBody>
+      </p:sp>
+    </p:spTree>
+    <p:extLst>
+      <p:ext uri="{BB962C8B-B14F-4D97-AF65-F5344CB8AC3E}">
+        <p14:creationId xmlns:p14="http://schemas.microsoft.com/office/powerpoint/2010/main" val="4102220416"/>
+      </p:ext>
+    </p:extLst>
+  </p:cSld>
+  <p:clrMapOvr>
+    <a:masterClrMapping/>
+  </p:clrMapOvr>
+  <p:timing>
+    <p:tnLst>
+      <p:par>
+        <p:cTn id="1" dur="indefinite" restart="never" nodeType="tmRoot"/>
+      </p:par>
+    </p:tnLst>
+  </p:timing>
+</p:sld>
+</file>
+
+<file path=ppt/slides/slide17.xml><?xml version="1.0" encoding="utf-8"?>
+<p:sld xmlns:a="http://schemas.openxmlformats.org/drawingml/2006/main" xmlns:r="http://schemas.openxmlformats.org/officeDocument/2006/relationships" xmlns:p="http://schemas.openxmlformats.org/presentationml/2006/main">
+  <p:cSld>
+    <p:spTree>
+      <p:nvGrpSpPr>
+        <p:cNvPr id="1" name=""/>
+        <p:cNvGrpSpPr/>
+        <p:nvPr/>
+      </p:nvGrpSpPr>
+      <p:grpSpPr>
+        <a:xfrm>
+          <a:off x="0" y="0"/>
+          <a:ext cx="0" cy="0"/>
+          <a:chOff x="0" y="0"/>
+          <a:chExt cx="0" cy="0"/>
+        </a:xfrm>
+      </p:grpSpPr>
+      <p:sp>
+        <p:nvSpPr>
+          <p:cNvPr id="15" name="TextBox 14"/>
+          <p:cNvSpPr txBox="1"/>
+          <p:nvPr/>
+        </p:nvSpPr>
+        <p:spPr>
+          <a:xfrm>
+            <a:off x="575340" y="2048189"/>
+            <a:ext cx="8064896" cy="2031325"/>
+          </a:xfrm>
+          <a:prstGeom prst="rect">
+            <a:avLst/>
+          </a:prstGeom>
+          <a:noFill/>
+        </p:spPr>
+        <p:txBody>
+          <a:bodyPr wrap="square" rtlCol="0">
+            <a:spAutoFit/>
+          </a:bodyPr>
+          <a:lstStyle/>
+          <a:p>
+            <a:pPr marL="285750" indent="-285750">
+              <a:buFont typeface="Courier New" pitchFamily="49" charset="0"/>
+              <a:buChar char="o"/>
+            </a:pPr>
+            <a:r>
+              <a:rPr lang="nl-BE" dirty="0" smtClean="0"/>
+              <a:t>Weer &amp; Parkingsgegevens verzamelen</a:t>
+            </a:r>
+          </a:p>
+          <a:p>
+            <a:pPr marL="285750" indent="-285750">
+              <a:buFont typeface="Courier New" pitchFamily="49" charset="0"/>
+              <a:buChar char="o"/>
+            </a:pPr>
+            <a:endParaRPr lang="nl-BE" dirty="0" smtClean="0"/>
+          </a:p>
+          <a:p>
+            <a:pPr marL="285750" indent="-285750">
+              <a:buFont typeface="Courier New" pitchFamily="49" charset="0"/>
+              <a:buChar char="o"/>
+            </a:pPr>
+            <a:r>
+              <a:rPr lang="nl-BE" dirty="0" smtClean="0"/>
+              <a:t>REST service voor route gegevens</a:t>
+            </a:r>
+          </a:p>
+          <a:p>
+            <a:pPr marL="285750" indent="-285750">
+              <a:buFont typeface="Courier New" pitchFamily="49" charset="0"/>
+              <a:buChar char="o"/>
+            </a:pPr>
+            <a:endParaRPr lang="nl-BE" dirty="0"/>
+          </a:p>
+          <a:p>
+            <a:pPr marL="285750" indent="-285750">
+              <a:buFont typeface="Courier New" pitchFamily="49" charset="0"/>
+              <a:buChar char="o"/>
+            </a:pPr>
+            <a:r>
+              <a:rPr lang="nl-BE" dirty="0" smtClean="0"/>
+              <a:t>Twitter integratie</a:t>
+            </a:r>
+          </a:p>
+          <a:p>
+            <a:pPr marL="285750" indent="-285750">
+              <a:buFont typeface="Courier New" pitchFamily="49" charset="0"/>
+              <a:buChar char="o"/>
+            </a:pPr>
+            <a:endParaRPr lang="nl-BE" dirty="0" smtClean="0"/>
+          </a:p>
+          <a:p>
+            <a:pPr marL="285750" indent="-285750">
+              <a:buFont typeface="Courier New" pitchFamily="49" charset="0"/>
+              <a:buChar char="o"/>
+            </a:pPr>
+            <a:r>
+              <a:rPr lang="nl-BE" dirty="0" smtClean="0"/>
+              <a:t>Dashboard</a:t>
+            </a:r>
+          </a:p>
+        </p:txBody>
+      </p:sp>
+      <p:sp>
+        <p:nvSpPr>
+          <p:cNvPr id="16" name="Rectangle 15"/>
+          <p:cNvSpPr/>
+          <p:nvPr/>
+        </p:nvSpPr>
+        <p:spPr>
+          <a:xfrm>
+            <a:off x="683568" y="1592062"/>
+            <a:ext cx="4032448" cy="369332"/>
+          </a:xfrm>
+          <a:prstGeom prst="rect">
+            <a:avLst/>
+          </a:prstGeom>
+        </p:spPr>
+        <p:txBody>
+          <a:bodyPr wrap="square">
+            <a:spAutoFit/>
+          </a:bodyPr>
+          <a:lstStyle/>
+          <a:p>
+            <a:r>
+              <a:rPr lang="nl-BE" b="1" dirty="0" smtClean="0"/>
+              <a:t>Product </a:t>
+            </a:r>
+            <a:r>
+              <a:rPr lang="nl-BE" b="1" dirty="0" err="1" smtClean="0"/>
+              <a:t>backlog</a:t>
+            </a:r>
+            <a:r>
+              <a:rPr lang="nl-BE" b="1" dirty="0" smtClean="0"/>
+              <a:t> sprint #2</a:t>
+            </a:r>
+            <a:endParaRPr lang="nl-BE" b="1" dirty="0" smtClean="0"/>
+          </a:p>
+        </p:txBody>
+      </p:sp>
+      <p:sp>
+        <p:nvSpPr>
+          <p:cNvPr id="2" name="Slide Number Placeholder 1"/>
+          <p:cNvSpPr>
+            <a:spLocks noGrp="1"/>
+          </p:cNvSpPr>
+          <p:nvPr>
+            <p:ph type="sldNum" sz="quarter" idx="11"/>
+          </p:nvPr>
+        </p:nvSpPr>
+        <p:spPr/>
+        <p:txBody>
+          <a:bodyPr/>
+          <a:lstStyle/>
+          <a:p>
+            <a:fld id="{A28A35A8-C0E1-4C56-AA56-4AA6340DD3FD}" type="slidenum">
+              <a:rPr lang="nl-BE" smtClean="0"/>
+              <a:t>17</a:t>
+            </a:fld>
+            <a:endParaRPr lang="nl-BE"/>
+          </a:p>
+        </p:txBody>
+      </p:sp>
+      <p:sp>
+        <p:nvSpPr>
+          <p:cNvPr id="5" name="TextBox 4"/>
+          <p:cNvSpPr txBox="1"/>
+          <p:nvPr/>
+        </p:nvSpPr>
+        <p:spPr>
+          <a:xfrm>
+            <a:off x="1513072" y="6248400"/>
+            <a:ext cx="7272808" cy="369332"/>
+          </a:xfrm>
+          <a:prstGeom prst="rect">
+            <a:avLst/>
+          </a:prstGeom>
+          <a:noFill/>
+        </p:spPr>
+        <p:txBody>
+          <a:bodyPr wrap="square" rtlCol="0">
+            <a:spAutoFit/>
+          </a:bodyPr>
+          <a:lstStyle/>
+          <a:p>
+            <a:r>
+              <a:rPr lang="nl-BE" dirty="0" smtClean="0"/>
+              <a:t>Waar staan we – Demo – Structuur – Issues – </a:t>
+            </a:r>
+            <a:r>
+              <a:rPr lang="nl-BE" b="1" dirty="0" smtClean="0"/>
+              <a:t>Sprint #2</a:t>
+            </a:r>
+            <a:r>
+              <a:rPr lang="nl-BE" dirty="0" smtClean="0"/>
+              <a:t> - Vragen</a:t>
+            </a:r>
+            <a:endParaRPr lang="nl-BE" dirty="0"/>
+          </a:p>
+        </p:txBody>
+      </p:sp>
+    </p:spTree>
+    <p:extLst>
+      <p:ext uri="{BB962C8B-B14F-4D97-AF65-F5344CB8AC3E}">
+        <p14:creationId xmlns:p14="http://schemas.microsoft.com/office/powerpoint/2010/main" val="1405050281"/>
+      </p:ext>
+    </p:extLst>
+  </p:cSld>
+  <p:clrMapOvr>
+    <a:masterClrMapping/>
+  </p:clrMapOvr>
+  <p:timing>
+    <p:tnLst>
+      <p:par>
+        <p:cTn id="1" dur="indefinite" restart="never" nodeType="tmRoot"/>
+      </p:par>
+    </p:tnLst>
+  </p:timing>
+</p:sld>
+</file>
+
+<file path=ppt/slides/slide18.xml><?xml version="1.0" encoding="utf-8"?>
+<p:sld xmlns:a="http://schemas.openxmlformats.org/drawingml/2006/main" xmlns:r="http://schemas.openxmlformats.org/officeDocument/2006/relationships" xmlns:p="http://schemas.openxmlformats.org/presentationml/2006/main">
+  <p:cSld>
+    <p:spTree>
+      <p:nvGrpSpPr>
+        <p:cNvPr id="1" name=""/>
+        <p:cNvGrpSpPr/>
+        <p:nvPr/>
+      </p:nvGrpSpPr>
+      <p:grpSpPr>
+        <a:xfrm>
+          <a:off x="0" y="0"/>
+          <a:ext cx="0" cy="0"/>
+          <a:chOff x="0" y="0"/>
+          <a:chExt cx="0" cy="0"/>
+        </a:xfrm>
+      </p:grpSpPr>
+      <p:sp>
+        <p:nvSpPr>
+          <p:cNvPr id="16" name="Rectangle 15"/>
+          <p:cNvSpPr/>
+          <p:nvPr/>
+        </p:nvSpPr>
+        <p:spPr>
+          <a:xfrm>
+            <a:off x="683568" y="1592062"/>
+            <a:ext cx="4032448" cy="369332"/>
+          </a:xfrm>
+          <a:prstGeom prst="rect">
+            <a:avLst/>
+          </a:prstGeom>
+        </p:spPr>
+        <p:txBody>
+          <a:bodyPr wrap="square">
+            <a:spAutoFit/>
+          </a:bodyPr>
+          <a:lstStyle/>
+          <a:p>
+            <a:r>
+              <a:rPr lang="nl-BE" b="1" dirty="0" err="1" smtClean="0"/>
+              <a:t>Mockup</a:t>
+            </a:r>
+            <a:r>
+              <a:rPr lang="nl-BE" b="1" dirty="0" smtClean="0"/>
+              <a:t> </a:t>
+            </a:r>
+            <a:r>
+              <a:rPr lang="nl-BE" b="1" dirty="0" smtClean="0"/>
+              <a:t>Dashboard + </a:t>
+            </a:r>
+            <a:r>
+              <a:rPr lang="nl-BE" b="1" dirty="0" err="1" smtClean="0"/>
+              <a:t>Logging</a:t>
+            </a:r>
+            <a:endParaRPr lang="nl-BE" b="1" dirty="0" smtClean="0"/>
+          </a:p>
+        </p:txBody>
+      </p:sp>
+      <p:sp>
+        <p:nvSpPr>
+          <p:cNvPr id="2" name="Slide Number Placeholder 1"/>
+          <p:cNvSpPr>
+            <a:spLocks noGrp="1"/>
+          </p:cNvSpPr>
+          <p:nvPr>
+            <p:ph type="sldNum" sz="quarter" idx="11"/>
+          </p:nvPr>
+        </p:nvSpPr>
+        <p:spPr/>
+        <p:txBody>
+          <a:bodyPr/>
+          <a:lstStyle/>
+          <a:p>
+            <a:fld id="{A28A35A8-C0E1-4C56-AA56-4AA6340DD3FD}" type="slidenum">
+              <a:rPr lang="nl-BE" smtClean="0"/>
+              <a:t>18</a:t>
+            </a:fld>
+            <a:endParaRPr lang="nl-BE"/>
+          </a:p>
+        </p:txBody>
+      </p:sp>
+      <p:sp>
+        <p:nvSpPr>
+          <p:cNvPr id="5" name="TextBox 4"/>
+          <p:cNvSpPr txBox="1"/>
+          <p:nvPr/>
+        </p:nvSpPr>
+        <p:spPr>
+          <a:xfrm>
+            <a:off x="1513072" y="6248400"/>
+            <a:ext cx="7272808" cy="369332"/>
+          </a:xfrm>
+          <a:prstGeom prst="rect">
+            <a:avLst/>
+          </a:prstGeom>
+          <a:noFill/>
+        </p:spPr>
+        <p:txBody>
+          <a:bodyPr wrap="square" rtlCol="0">
+            <a:spAutoFit/>
+          </a:bodyPr>
+          <a:lstStyle/>
+          <a:p>
+            <a:r>
+              <a:rPr lang="nl-BE" dirty="0" smtClean="0"/>
+              <a:t>Waar staan we – Demo – Structuur – Issues – </a:t>
+            </a:r>
+            <a:r>
+              <a:rPr lang="nl-BE" b="1" dirty="0" smtClean="0"/>
+              <a:t>Sprint #2</a:t>
+            </a:r>
+            <a:r>
+              <a:rPr lang="nl-BE" dirty="0" smtClean="0"/>
+              <a:t> - Vragen</a:t>
+            </a:r>
+            <a:endParaRPr lang="nl-BE" dirty="0"/>
+          </a:p>
+        </p:txBody>
+      </p:sp>
+      <p:pic>
+        <p:nvPicPr>
+          <p:cNvPr id="3" name="Picture 2"/>
+          <p:cNvPicPr>
+            <a:picLocks noChangeAspect="1"/>
+          </p:cNvPicPr>
+          <p:nvPr/>
+        </p:nvPicPr>
+        <p:blipFill>
+          <a:blip r:embed="rId2">
+            <a:extLst>
+              <a:ext uri="{28A0092B-C50C-407E-A947-70E740481C1C}">
+                <a14:useLocalDpi xmlns:a14="http://schemas.microsoft.com/office/drawing/2010/main" val="0"/>
+              </a:ext>
+            </a:extLst>
+          </a:blip>
+          <a:stretch>
+            <a:fillRect/>
+          </a:stretch>
+        </p:blipFill>
+        <p:spPr>
+          <a:xfrm>
+            <a:off x="251520" y="2132856"/>
+            <a:ext cx="3577536" cy="2804479"/>
+          </a:xfrm>
+          <a:prstGeom prst="rect">
+            <a:avLst/>
+          </a:prstGeom>
+        </p:spPr>
+      </p:pic>
+      <p:pic>
+        <p:nvPicPr>
+          <p:cNvPr id="4" name="Picture 3"/>
+          <p:cNvPicPr>
+            <a:picLocks noChangeAspect="1"/>
+          </p:cNvPicPr>
+          <p:nvPr/>
+        </p:nvPicPr>
+        <p:blipFill>
+          <a:blip r:embed="rId3" cstate="print">
+            <a:extLst>
+              <a:ext uri="{28A0092B-C50C-407E-A947-70E740481C1C}">
+                <a14:useLocalDpi xmlns:a14="http://schemas.microsoft.com/office/drawing/2010/main" val="0"/>
+              </a:ext>
+            </a:extLst>
+          </a:blip>
+          <a:stretch>
+            <a:fillRect/>
+          </a:stretch>
+        </p:blipFill>
+        <p:spPr>
+          <a:xfrm>
+            <a:off x="4028728" y="2636912"/>
+            <a:ext cx="4734272" cy="2173648"/>
+          </a:xfrm>
+          <a:prstGeom prst="rect">
+            <a:avLst/>
+          </a:prstGeom>
+        </p:spPr>
+      </p:pic>
+    </p:spTree>
+    <p:extLst>
+      <p:ext uri="{BB962C8B-B14F-4D97-AF65-F5344CB8AC3E}">
+        <p14:creationId xmlns:p14="http://schemas.microsoft.com/office/powerpoint/2010/main" val="1613731353"/>
+      </p:ext>
+    </p:extLst>
+  </p:cSld>
+  <p:clrMapOvr>
+    <a:masterClrMapping/>
+  </p:clrMapOvr>
+  <p:timing>
+    <p:tnLst>
+      <p:par>
+        <p:cTn id="1" dur="indefinite" restart="never" nodeType="tmRoot"/>
+      </p:par>
+    </p:tnLst>
+  </p:timing>
+</p:sld>
+</file>
+
+<file path=ppt/slides/slide19.xml><?xml version="1.0" encoding="utf-8"?>
+<p:sld xmlns:a="http://schemas.openxmlformats.org/drawingml/2006/main" xmlns:r="http://schemas.openxmlformats.org/officeDocument/2006/relationships" xmlns:p="http://schemas.openxmlformats.org/presentationml/2006/main">
+  <p:cSld>
+    <p:spTree>
+      <p:nvGrpSpPr>
+        <p:cNvPr id="1" name=""/>
+        <p:cNvGrpSpPr/>
+        <p:nvPr/>
+      </p:nvGrpSpPr>
+      <p:grpSpPr>
+        <a:xfrm>
+          <a:off x="0" y="0"/>
+          <a:ext cx="0" cy="0"/>
+          <a:chOff x="0" y="0"/>
+          <a:chExt cx="0" cy="0"/>
+        </a:xfrm>
+      </p:grpSpPr>
+      <p:sp>
+        <p:nvSpPr>
+          <p:cNvPr id="4" name="Title 3"/>
+          <p:cNvSpPr>
+            <a:spLocks noGrp="1"/>
+          </p:cNvSpPr>
+          <p:nvPr>
+            <p:ph type="title"/>
+          </p:nvPr>
+        </p:nvSpPr>
+        <p:spPr/>
+        <p:txBody>
+          <a:bodyPr/>
+          <a:lstStyle/>
+          <a:p>
+            <a:r>
+              <a:rPr lang="nl-BE" dirty="0" smtClean="0"/>
               <a:t>Vragen?</a:t>
             </a:r>
             <a:endParaRPr lang="nl-BE" dirty="0"/>
+          </a:p>
+        </p:txBody>
+      </p:sp>
+      <p:sp>
+        <p:nvSpPr>
+          <p:cNvPr id="2" name="Slide Number Placeholder 1"/>
+          <p:cNvSpPr>
+            <a:spLocks noGrp="1"/>
+          </p:cNvSpPr>
+          <p:nvPr>
+            <p:ph type="sldNum" sz="quarter" idx="11"/>
+          </p:nvPr>
+        </p:nvSpPr>
+        <p:spPr/>
+        <p:txBody>
+          <a:bodyPr/>
+          <a:lstStyle/>
+          <a:p>
+            <a:fld id="{A28A35A8-C0E1-4C56-AA56-4AA6340DD3FD}" type="slidenum">
+              <a:rPr lang="nl-BE" smtClean="0"/>
+              <a:t>19</a:t>
+            </a:fld>
+            <a:endParaRPr lang="nl-BE"/>
+          </a:p>
+        </p:txBody>
+      </p:sp>
+      <p:sp>
+        <p:nvSpPr>
+          <p:cNvPr id="5" name="TextBox 4"/>
+          <p:cNvSpPr txBox="1"/>
+          <p:nvPr/>
+        </p:nvSpPr>
+        <p:spPr>
+          <a:xfrm>
+            <a:off x="1513072" y="6248400"/>
+            <a:ext cx="7272808" cy="369332"/>
+          </a:xfrm>
+          <a:prstGeom prst="rect">
+            <a:avLst/>
+          </a:prstGeom>
+          <a:noFill/>
+        </p:spPr>
+        <p:txBody>
+          <a:bodyPr wrap="square" rtlCol="0">
+            <a:spAutoFit/>
+          </a:bodyPr>
+          <a:lstStyle/>
+          <a:p>
+            <a:r>
+              <a:rPr lang="nl-BE" dirty="0" smtClean="0"/>
+              <a:t>Waar staan we – Demo – Structuur – Issues – Sprint #2 - </a:t>
+            </a:r>
+            <a:r>
+              <a:rPr lang="nl-BE" b="1" dirty="0" smtClean="0"/>
+              <a:t>Vragen</a:t>
+            </a:r>
+            <a:endParaRPr lang="nl-BE" b="1" dirty="0"/>
           </a:p>
         </p:txBody>
       </p:sp>
@@ -3906,14 +5713,162 @@
             <p:ph type="title"/>
           </p:nvPr>
         </p:nvSpPr>
+        <p:spPr>
+          <a:xfrm>
+            <a:off x="1259632" y="1484784"/>
+            <a:ext cx="7315200" cy="936104"/>
+          </a:xfrm>
+        </p:spPr>
+        <p:txBody>
+          <a:bodyPr/>
+          <a:lstStyle/>
+          <a:p>
+            <a:r>
+              <a:rPr lang="nl-BE" dirty="0" smtClean="0"/>
+              <a:t>Inhoudsopgave</a:t>
+            </a:r>
+            <a:endParaRPr lang="nl-BE" dirty="0"/>
+          </a:p>
+        </p:txBody>
+      </p:sp>
+      <p:sp>
+        <p:nvSpPr>
+          <p:cNvPr id="2" name="TextBox 1"/>
+          <p:cNvSpPr txBox="1"/>
+          <p:nvPr/>
+        </p:nvSpPr>
+        <p:spPr>
+          <a:xfrm>
+            <a:off x="1259632" y="2636912"/>
+            <a:ext cx="7315200" cy="2031325"/>
+          </a:xfrm>
+          <a:prstGeom prst="rect">
+            <a:avLst/>
+          </a:prstGeom>
+          <a:noFill/>
+        </p:spPr>
+        <p:txBody>
+          <a:bodyPr wrap="square" rtlCol="0">
+            <a:spAutoFit/>
+          </a:bodyPr>
+          <a:lstStyle/>
+          <a:p>
+            <a:pPr marL="285750" indent="-285750">
+              <a:buFont typeface="Arial" panose="020B0604020202020204" pitchFamily="34" charset="0"/>
+              <a:buChar char="•"/>
+            </a:pPr>
+            <a:r>
+              <a:rPr lang="nl-BE" dirty="0" smtClean="0"/>
+              <a:t>Waar staan we</a:t>
+            </a:r>
+          </a:p>
+          <a:p>
+            <a:pPr marL="285750" indent="-285750">
+              <a:buFont typeface="Arial" panose="020B0604020202020204" pitchFamily="34" charset="0"/>
+              <a:buChar char="•"/>
+            </a:pPr>
+            <a:r>
+              <a:rPr lang="nl-BE" dirty="0" smtClean="0"/>
+              <a:t>Demo</a:t>
+            </a:r>
+          </a:p>
+          <a:p>
+            <a:pPr marL="285750" indent="-285750">
+              <a:buFont typeface="Arial" panose="020B0604020202020204" pitchFamily="34" charset="0"/>
+              <a:buChar char="•"/>
+            </a:pPr>
+            <a:r>
+              <a:rPr lang="nl-BE" dirty="0" smtClean="0"/>
+              <a:t>Structuur</a:t>
+            </a:r>
+          </a:p>
+          <a:p>
+            <a:pPr marL="285750" indent="-285750">
+              <a:buFont typeface="Arial" panose="020B0604020202020204" pitchFamily="34" charset="0"/>
+              <a:buChar char="•"/>
+            </a:pPr>
+            <a:r>
+              <a:rPr lang="nl-BE" dirty="0" smtClean="0"/>
+              <a:t>Nog op te lossen issues</a:t>
+            </a:r>
+          </a:p>
+          <a:p>
+            <a:pPr marL="285750" indent="-285750">
+              <a:buFont typeface="Arial" panose="020B0604020202020204" pitchFamily="34" charset="0"/>
+              <a:buChar char="•"/>
+            </a:pPr>
+            <a:r>
+              <a:rPr lang="nl-BE" dirty="0" smtClean="0"/>
+              <a:t>Targets voor sprint #2</a:t>
+            </a:r>
+          </a:p>
+          <a:p>
+            <a:pPr marL="285750" indent="-285750">
+              <a:buFont typeface="Arial" panose="020B0604020202020204" pitchFamily="34" charset="0"/>
+              <a:buChar char="•"/>
+            </a:pPr>
+            <a:r>
+              <a:rPr lang="nl-BE" dirty="0" smtClean="0"/>
+              <a:t>Vragen</a:t>
+            </a:r>
+          </a:p>
+          <a:p>
+            <a:pPr marL="285750" indent="-285750">
+              <a:buFont typeface="Arial" panose="020B0604020202020204" pitchFamily="34" charset="0"/>
+              <a:buChar char="•"/>
+            </a:pPr>
+            <a:endParaRPr lang="nl-BE" dirty="0" smtClean="0"/>
+          </a:p>
+        </p:txBody>
+      </p:sp>
+      <p:sp>
+        <p:nvSpPr>
+          <p:cNvPr id="3" name="Slide Number Placeholder 2"/>
+          <p:cNvSpPr>
+            <a:spLocks noGrp="1"/>
+          </p:cNvSpPr>
+          <p:nvPr>
+            <p:ph type="sldNum" sz="quarter" idx="11"/>
+          </p:nvPr>
+        </p:nvSpPr>
         <p:spPr/>
         <p:txBody>
           <a:bodyPr/>
           <a:lstStyle/>
           <a:p>
+            <a:fld id="{A28A35A8-C0E1-4C56-AA56-4AA6340DD3FD}" type="slidenum">
+              <a:rPr lang="nl-BE" smtClean="0"/>
+              <a:t>2</a:t>
+            </a:fld>
+            <a:endParaRPr lang="nl-BE"/>
+          </a:p>
+        </p:txBody>
+      </p:sp>
+      <p:sp>
+        <p:nvSpPr>
+          <p:cNvPr id="5" name="TextBox 4"/>
+          <p:cNvSpPr txBox="1"/>
+          <p:nvPr/>
+        </p:nvSpPr>
+        <p:spPr>
+          <a:xfrm>
+            <a:off x="1513072" y="6248400"/>
+            <a:ext cx="7272808" cy="369332"/>
+          </a:xfrm>
+          <a:prstGeom prst="rect">
+            <a:avLst/>
+          </a:prstGeom>
+          <a:noFill/>
+        </p:spPr>
+        <p:txBody>
+          <a:bodyPr wrap="square" rtlCol="0">
+            <a:spAutoFit/>
+          </a:bodyPr>
+          <a:lstStyle/>
+          <a:p>
             <a:r>
               <a:rPr lang="nl-BE" dirty="0" smtClean="0"/>
-              <a:t>Waar staan we?</a:t>
+              <a:t>Waar staan we – Demo – Structuur – Issues – Sprint #2 - Vragen</a:t>
             </a:r>
             <a:endParaRPr lang="nl-BE" dirty="0"/>
           </a:p>
@@ -3958,14 +5913,60 @@
       </p:grpSpPr>
       <p:sp>
         <p:nvSpPr>
-          <p:cNvPr id="15" name="TextBox 14"/>
+          <p:cNvPr id="4" name="Title 3"/>
+          <p:cNvSpPr>
+            <a:spLocks noGrp="1"/>
+          </p:cNvSpPr>
+          <p:nvPr>
+            <p:ph type="title"/>
+          </p:nvPr>
+        </p:nvSpPr>
+        <p:spPr/>
+        <p:txBody>
+          <a:bodyPr/>
+          <a:lstStyle/>
+          <a:p>
+            <a:r>
+              <a:rPr lang="nl-BE" dirty="0" smtClean="0"/>
+              <a:t>Waar staan we?</a:t>
+            </a:r>
+            <a:endParaRPr lang="nl-BE" dirty="0"/>
+          </a:p>
+        </p:txBody>
+      </p:sp>
+      <p:sp>
+        <p:nvSpPr>
+          <p:cNvPr id="2" name="Slide Number Placeholder 1"/>
+          <p:cNvSpPr>
+            <a:spLocks noGrp="1"/>
+          </p:cNvSpPr>
+          <p:nvPr>
+            <p:ph type="sldNum" sz="quarter" idx="11"/>
+          </p:nvPr>
+        </p:nvSpPr>
+        <p:spPr/>
+        <p:txBody>
+          <a:bodyPr/>
+          <a:lstStyle/>
+          <a:p>
+            <a:fld id="{A28A35A8-C0E1-4C56-AA56-4AA6340DD3FD}" type="slidenum">
+              <a:rPr lang="nl-BE" smtClean="0"/>
+              <a:t>3</a:t>
+            </a:fld>
+            <a:endParaRPr lang="nl-BE"/>
+          </a:p>
+        </p:txBody>
+      </p:sp>
+      <p:sp>
+        <p:nvSpPr>
+          <p:cNvPr id="5" name="TextBox 4"/>
           <p:cNvSpPr txBox="1"/>
           <p:nvPr/>
         </p:nvSpPr>
         <p:spPr>
           <a:xfrm>
-            <a:off x="575340" y="2048189"/>
-            <a:ext cx="8064896" cy="4801314"/>
+            <a:off x="1513072" y="6248400"/>
+            <a:ext cx="7272808" cy="369332"/>
           </a:xfrm>
           <a:prstGeom prst="rect">
             <a:avLst/>
@@ -3978,162 +5979,22 @@
           </a:bodyPr>
           <a:lstStyle/>
           <a:p>
-            <a:pPr marL="285750" indent="-285750">
-              <a:buFont typeface="Wingdings" pitchFamily="2" charset="2"/>
-              <a:buChar char="ü"/>
-            </a:pPr>
+            <a:r>
+              <a:rPr lang="nl-BE" b="1" dirty="0" smtClean="0"/>
+              <a:t>Waar staan we </a:t>
+            </a:r>
             <a:r>
               <a:rPr lang="nl-BE" dirty="0" smtClean="0"/>
-              <a:t>Applicatie framework: CSS, MVC, database, ...</a:t>
-            </a:r>
-          </a:p>
-          <a:p>
-            <a:endParaRPr lang="nl-BE" dirty="0" smtClean="0"/>
-          </a:p>
-          <a:p>
-            <a:pPr marL="285750" indent="-285750">
-              <a:buFont typeface="Wingdings" pitchFamily="2" charset="2"/>
-              <a:buChar char="ü"/>
-            </a:pPr>
-            <a:r>
-              <a:rPr lang="nl-BE" dirty="0" smtClean="0"/>
-              <a:t>Implementatie traffic providers: Here, Google, Waze, TomTom,...</a:t>
-            </a:r>
-          </a:p>
-          <a:p>
-            <a:endParaRPr lang="nl-BE" dirty="0" smtClean="0"/>
-          </a:p>
-          <a:p>
-            <a:pPr marL="285750" indent="-285750">
-              <a:buFont typeface="Wingdings" pitchFamily="2" charset="2"/>
-              <a:buChar char="ü"/>
-            </a:pPr>
-            <a:r>
-              <a:rPr lang="nl-BE" dirty="0" smtClean="0"/>
-              <a:t>Poll service</a:t>
-            </a:r>
-          </a:p>
-          <a:p>
-            <a:pPr marL="285750" indent="-285750">
-              <a:buFont typeface="Wingdings" pitchFamily="2" charset="2"/>
-              <a:buChar char="ü"/>
-            </a:pPr>
-            <a:endParaRPr lang="nl-BE" dirty="0" smtClean="0"/>
-          </a:p>
-          <a:p>
-            <a:pPr marL="285750" indent="-285750">
-              <a:buFont typeface="Wingdings" pitchFamily="2" charset="2"/>
-              <a:buChar char="ü"/>
-            </a:pPr>
-            <a:r>
-              <a:rPr lang="nl-BE" dirty="0" smtClean="0"/>
-              <a:t>Web interface: overzicht trajecten met huidige reistijd</a:t>
-            </a:r>
-          </a:p>
-          <a:p>
-            <a:pPr marL="285750" indent="-285750">
-              <a:buFont typeface="Wingdings" pitchFamily="2" charset="2"/>
-              <a:buChar char="ü"/>
-            </a:pPr>
+              <a:t>– Demo – Structuur – Issues – Sprint #2 - Vragen</a:t>
+            </a:r>
             <a:endParaRPr lang="nl-BE" dirty="0"/>
-          </a:p>
-          <a:p>
-            <a:pPr marL="285750" indent="-285750">
-              <a:buFont typeface="Courier New" pitchFamily="49" charset="0"/>
-              <a:buChar char="o"/>
-            </a:pPr>
-            <a:r>
-              <a:rPr lang="nl-BE" dirty="0" smtClean="0"/>
-              <a:t>Betrouwbaarheidsfactor</a:t>
-            </a:r>
-          </a:p>
-          <a:p>
-            <a:endParaRPr lang="nl-BE" dirty="0" smtClean="0"/>
-          </a:p>
-          <a:p>
-            <a:pPr marL="285750" indent="-285750">
-              <a:buFont typeface="Wingdings" pitchFamily="2" charset="2"/>
-              <a:buChar char="ü"/>
-            </a:pPr>
-            <a:endParaRPr lang="nl-BE" dirty="0" smtClean="0"/>
-          </a:p>
-          <a:p>
-            <a:pPr marL="285750" indent="-285750">
-              <a:buFont typeface="Wingdings" pitchFamily="2" charset="2"/>
-              <a:buChar char="ü"/>
-            </a:pPr>
-            <a:endParaRPr lang="nl-BE" dirty="0" smtClean="0"/>
-          </a:p>
-          <a:p>
-            <a:pPr marL="285750" indent="-285750">
-              <a:buFont typeface="Wingdings" pitchFamily="2" charset="2"/>
-              <a:buChar char="ü"/>
-            </a:pPr>
-            <a:endParaRPr lang="nl-BE" dirty="0" smtClean="0"/>
-          </a:p>
-          <a:p>
-            <a:pPr marL="285750" indent="-285750">
-              <a:buFont typeface="Wingdings" pitchFamily="2" charset="2"/>
-              <a:buChar char="ü"/>
-            </a:pPr>
-            <a:endParaRPr lang="nl-BE" dirty="0" smtClean="0"/>
-          </a:p>
-          <a:p>
-            <a:pPr marL="285750" indent="-285750">
-              <a:buFont typeface="Wingdings" pitchFamily="2" charset="2"/>
-              <a:buChar char="ü"/>
-            </a:pPr>
-            <a:endParaRPr lang="nl-BE" dirty="0" smtClean="0"/>
-          </a:p>
-          <a:p>
-            <a:pPr marL="285750" indent="-285750">
-              <a:buFont typeface="Wingdings" pitchFamily="2" charset="2"/>
-              <a:buChar char="ü"/>
-            </a:pPr>
-            <a:endParaRPr lang="nl-BE" dirty="0" smtClean="0"/>
-          </a:p>
-          <a:p>
-            <a:pPr marL="285750" indent="-285750">
-              <a:buFont typeface="Arial" pitchFamily="34" charset="0"/>
-              <a:buChar char="•"/>
-            </a:pPr>
-            <a:endParaRPr lang="nl-BE" dirty="0"/>
-          </a:p>
-        </p:txBody>
-      </p:sp>
-      <p:sp>
-        <p:nvSpPr>
-          <p:cNvPr id="16" name="Rectangle 15"/>
-          <p:cNvSpPr/>
-          <p:nvPr/>
-        </p:nvSpPr>
-        <p:spPr>
-          <a:xfrm>
-            <a:off x="683568" y="1592062"/>
-            <a:ext cx="1001108" cy="369332"/>
-          </a:xfrm>
-          <a:prstGeom prst="rect">
-            <a:avLst/>
-          </a:prstGeom>
-        </p:spPr>
-        <p:txBody>
-          <a:bodyPr wrap="none">
-            <a:spAutoFit/>
-          </a:bodyPr>
-          <a:lstStyle/>
-          <a:p>
-            <a:r>
-              <a:rPr lang="nl-BE" b="1" dirty="0" smtClean="0"/>
-              <a:t>Targets</a:t>
-            </a:r>
-            <a:endParaRPr lang="nl-BE" b="1" dirty="0" smtClean="0"/>
           </a:p>
         </p:txBody>
       </p:sp>
     </p:spTree>
     <p:extLst>
       <p:ext uri="{BB962C8B-B14F-4D97-AF65-F5344CB8AC3E}">
-        <p14:creationId xmlns:p14="http://schemas.microsoft.com/office/powerpoint/2010/main" val="3447186341"/>
+        <p14:creationId xmlns:p14="http://schemas.microsoft.com/office/powerpoint/2010/main" val="1139129186"/>
       </p:ext>
     </p:extLst>
   </p:cSld>
@@ -4176,7 +6037,7 @@
         <p:spPr>
           <a:xfrm>
             <a:off x="575340" y="2048189"/>
-            <a:ext cx="8064896" cy="1200329"/>
+            <a:ext cx="8064896" cy="4801314"/>
           </a:xfrm>
           <a:prstGeom prst="rect">
             <a:avLst/>
@@ -4195,7 +6056,7 @@
             </a:pPr>
             <a:r>
               <a:rPr lang="nl-BE" dirty="0" smtClean="0"/>
-              <a:t>Trajecten weergeven op kaart</a:t>
+              <a:t>Applicatie framework: CSS, MVC, database, ...</a:t>
             </a:r>
           </a:p>
           <a:p>
@@ -4208,10 +6069,106 @@
             </a:pPr>
             <a:r>
               <a:rPr lang="nl-BE" dirty="0" smtClean="0"/>
-              <a:t>Trajecten beheren (wijzigen)</a:t>
-            </a:r>
-          </a:p>
-          <a:p>
+              <a:t>Implementatie traffic providers: Here, Google, Waze, TomTom,...</a:t>
+            </a:r>
+          </a:p>
+          <a:p>
+            <a:endParaRPr lang="nl-BE" dirty="0" smtClean="0"/>
+          </a:p>
+          <a:p>
+            <a:pPr marL="285750" indent="-285750">
+              <a:buFont typeface="Wingdings" pitchFamily="2" charset="2"/>
+              <a:buChar char="ü"/>
+            </a:pPr>
+            <a:r>
+              <a:rPr lang="nl-BE" dirty="0" smtClean="0"/>
+              <a:t>Poll service</a:t>
+            </a:r>
+          </a:p>
+          <a:p>
+            <a:pPr marL="285750" indent="-285750">
+              <a:buFont typeface="Wingdings" pitchFamily="2" charset="2"/>
+              <a:buChar char="ü"/>
+            </a:pPr>
+            <a:endParaRPr lang="nl-BE" dirty="0" smtClean="0"/>
+          </a:p>
+          <a:p>
+            <a:pPr marL="285750" indent="-285750">
+              <a:buFont typeface="Wingdings" pitchFamily="2" charset="2"/>
+              <a:buChar char="ü"/>
+            </a:pPr>
+            <a:r>
+              <a:rPr lang="nl-BE" dirty="0" smtClean="0"/>
+              <a:t>Web interface: overzicht trajecten met huidige reistijd</a:t>
+            </a:r>
+          </a:p>
+          <a:p>
+            <a:pPr marL="285750" indent="-285750">
+              <a:buFont typeface="Wingdings" pitchFamily="2" charset="2"/>
+              <a:buChar char="ü"/>
+            </a:pPr>
+            <a:endParaRPr lang="nl-BE" dirty="0"/>
+          </a:p>
+          <a:p>
+            <a:pPr marL="285750" indent="-285750">
+              <a:buFont typeface="Courier New" pitchFamily="49" charset="0"/>
+              <a:buChar char="o"/>
+            </a:pPr>
+            <a:r>
+              <a:rPr lang="nl-BE" dirty="0" smtClean="0"/>
+              <a:t>Betrouwbaarheidsfactor</a:t>
+            </a:r>
+          </a:p>
+          <a:p>
+            <a:endParaRPr lang="nl-BE" dirty="0" smtClean="0"/>
+          </a:p>
+          <a:p>
+            <a:pPr marL="285750" indent="-285750">
+              <a:buFont typeface="Wingdings" pitchFamily="2" charset="2"/>
+              <a:buChar char="ü"/>
+            </a:pPr>
+            <a:endParaRPr lang="nl-BE" dirty="0" smtClean="0"/>
+          </a:p>
+          <a:p>
+            <a:pPr marL="285750" indent="-285750">
+              <a:buFont typeface="Wingdings" pitchFamily="2" charset="2"/>
+              <a:buChar char="ü"/>
+            </a:pPr>
+            <a:endParaRPr lang="nl-BE" dirty="0" smtClean="0"/>
+          </a:p>
+          <a:p>
+            <a:pPr marL="285750" indent="-285750">
+              <a:buFont typeface="Wingdings" pitchFamily="2" charset="2"/>
+              <a:buChar char="ü"/>
+            </a:pPr>
+            <a:endParaRPr lang="nl-BE" dirty="0" smtClean="0"/>
+          </a:p>
+          <a:p>
+            <a:pPr marL="285750" indent="-285750">
+              <a:buFont typeface="Wingdings" pitchFamily="2" charset="2"/>
+              <a:buChar char="ü"/>
+            </a:pPr>
+            <a:endParaRPr lang="nl-BE" dirty="0" smtClean="0"/>
+          </a:p>
+          <a:p>
+            <a:pPr marL="285750" indent="-285750">
+              <a:buFont typeface="Wingdings" pitchFamily="2" charset="2"/>
+              <a:buChar char="ü"/>
+            </a:pPr>
+            <a:endParaRPr lang="nl-BE" dirty="0" smtClean="0"/>
+          </a:p>
+          <a:p>
+            <a:pPr marL="285750" indent="-285750">
+              <a:buFont typeface="Wingdings" pitchFamily="2" charset="2"/>
+              <a:buChar char="ü"/>
+            </a:pPr>
+            <a:endParaRPr lang="nl-BE" dirty="0" smtClean="0"/>
+          </a:p>
+          <a:p>
+            <a:pPr marL="285750" indent="-285750">
+              <a:buFont typeface="Arial" pitchFamily="34" charset="0"/>
+              <a:buChar char="•"/>
+            </a:pPr>
             <a:endParaRPr lang="nl-BE" dirty="0"/>
           </a:p>
         </p:txBody>
@@ -4225,30 +6182,86 @@
         <p:spPr>
           <a:xfrm>
             <a:off x="683568" y="1592062"/>
-            <a:ext cx="4032448" cy="369332"/>
+            <a:ext cx="1001108" cy="369332"/>
           </a:xfrm>
           <a:prstGeom prst="rect">
             <a:avLst/>
           </a:prstGeom>
         </p:spPr>
         <p:txBody>
-          <a:bodyPr wrap="square">
+          <a:bodyPr wrap="none">
             <a:spAutoFit/>
           </a:bodyPr>
           <a:lstStyle/>
           <a:p>
             <a:r>
               <a:rPr lang="nl-BE" b="1" dirty="0" smtClean="0"/>
-              <a:t>Extra targets product backlog</a:t>
-            </a:r>
-            <a:endParaRPr lang="nl-BE" b="1" dirty="0" smtClean="0"/>
+              <a:t>Targets</a:t>
+            </a:r>
+          </a:p>
+        </p:txBody>
+      </p:sp>
+      <p:sp>
+        <p:nvSpPr>
+          <p:cNvPr id="2" name="Slide Number Placeholder 1"/>
+          <p:cNvSpPr>
+            <a:spLocks noGrp="1"/>
+          </p:cNvSpPr>
+          <p:nvPr>
+            <p:ph type="sldNum" sz="quarter" idx="11"/>
+          </p:nvPr>
+        </p:nvSpPr>
+        <p:spPr/>
+        <p:txBody>
+          <a:bodyPr/>
+          <a:lstStyle/>
+          <a:p>
+            <a:fld id="{A28A35A8-C0E1-4C56-AA56-4AA6340DD3FD}" type="slidenum">
+              <a:rPr lang="nl-BE" smtClean="0"/>
+              <a:t>4</a:t>
+            </a:fld>
+            <a:endParaRPr lang="nl-BE"/>
+          </a:p>
+        </p:txBody>
+      </p:sp>
+      <p:sp>
+        <p:nvSpPr>
+          <p:cNvPr id="5" name="TextBox 4"/>
+          <p:cNvSpPr txBox="1"/>
+          <p:nvPr/>
+        </p:nvSpPr>
+        <p:spPr>
+          <a:xfrm>
+            <a:off x="1513072" y="6248400"/>
+            <a:ext cx="7272808" cy="369332"/>
+          </a:xfrm>
+          <a:prstGeom prst="rect">
+            <a:avLst/>
+          </a:prstGeom>
+          <a:noFill/>
+        </p:spPr>
+        <p:txBody>
+          <a:bodyPr wrap="square" rtlCol="0">
+            <a:spAutoFit/>
+          </a:bodyPr>
+          <a:lstStyle/>
+          <a:p>
+            <a:r>
+              <a:rPr lang="nl-BE" b="1" dirty="0" smtClean="0"/>
+              <a:t>Waar staan we </a:t>
+            </a:r>
+            <a:r>
+              <a:rPr lang="nl-BE" dirty="0" smtClean="0"/>
+              <a:t>– Demo – Structuur – Issues – Sprint #2 - Vragen</a:t>
+            </a:r>
+            <a:endParaRPr lang="nl-BE" dirty="0"/>
           </a:p>
         </p:txBody>
       </p:sp>
     </p:spTree>
     <p:extLst>
       <p:ext uri="{BB962C8B-B14F-4D97-AF65-F5344CB8AC3E}">
-        <p14:creationId xmlns:p14="http://schemas.microsoft.com/office/powerpoint/2010/main" val="2468829193"/>
+        <p14:creationId xmlns:p14="http://schemas.microsoft.com/office/powerpoint/2010/main" val="3447186341"/>
       </p:ext>
     </p:extLst>
   </p:cSld>
@@ -4284,12 +6297,111 @@
       </p:grpSpPr>
       <p:sp>
         <p:nvSpPr>
-          <p:cNvPr id="4" name="Title 3"/>
+          <p:cNvPr id="15" name="TextBox 14"/>
+          <p:cNvSpPr txBox="1"/>
+          <p:nvPr/>
+        </p:nvSpPr>
+        <p:spPr>
+          <a:xfrm>
+            <a:off x="575340" y="2048189"/>
+            <a:ext cx="8064896" cy="1754326"/>
+          </a:xfrm>
+          <a:prstGeom prst="rect">
+            <a:avLst/>
+          </a:prstGeom>
+          <a:noFill/>
+        </p:spPr>
+        <p:txBody>
+          <a:bodyPr wrap="square" rtlCol="0">
+            <a:spAutoFit/>
+          </a:bodyPr>
+          <a:lstStyle/>
+          <a:p>
+            <a:pPr marL="285750" indent="-285750">
+              <a:buFont typeface="Wingdings" pitchFamily="2" charset="2"/>
+              <a:buChar char="ü"/>
+            </a:pPr>
+            <a:r>
+              <a:rPr lang="nl-BE" dirty="0" smtClean="0"/>
+              <a:t>Trajecten weergeven op kaart</a:t>
+            </a:r>
+          </a:p>
+          <a:p>
+            <a:endParaRPr lang="nl-BE" dirty="0" smtClean="0"/>
+          </a:p>
+          <a:p>
+            <a:pPr marL="285750" indent="-285750">
+              <a:buFont typeface="Wingdings" pitchFamily="2" charset="2"/>
+              <a:buChar char="ü"/>
+            </a:pPr>
+            <a:r>
+              <a:rPr lang="nl-BE" dirty="0" smtClean="0"/>
+              <a:t>Trajecten beheren (</a:t>
+            </a:r>
+            <a:r>
+              <a:rPr lang="nl-BE" dirty="0" smtClean="0"/>
+              <a:t>wijzigen, toevoegen, verwijderen)</a:t>
+            </a:r>
+          </a:p>
+          <a:p>
+            <a:pPr marL="285750" indent="-285750">
+              <a:buFont typeface="Wingdings" pitchFamily="2" charset="2"/>
+              <a:buChar char="ü"/>
+            </a:pPr>
+            <a:endParaRPr lang="nl-BE" dirty="0" smtClean="0"/>
+          </a:p>
+          <a:p>
+            <a:pPr marL="285750" indent="-285750">
+              <a:buFont typeface="Wingdings" pitchFamily="2" charset="2"/>
+              <a:buChar char="ü"/>
+            </a:pPr>
+            <a:r>
+              <a:rPr lang="nl-BE" dirty="0" smtClean="0"/>
+              <a:t>Statische informatiepagina’s</a:t>
+            </a:r>
+            <a:endParaRPr lang="nl-BE" dirty="0" smtClean="0"/>
+          </a:p>
+          <a:p>
+            <a:endParaRPr lang="nl-BE" dirty="0"/>
+          </a:p>
+        </p:txBody>
+      </p:sp>
+      <p:sp>
+        <p:nvSpPr>
+          <p:cNvPr id="16" name="Rectangle 15"/>
+          <p:cNvSpPr/>
+          <p:nvPr/>
+        </p:nvSpPr>
+        <p:spPr>
+          <a:xfrm>
+            <a:off x="683568" y="1592062"/>
+            <a:ext cx="4032448" cy="369332"/>
+          </a:xfrm>
+          <a:prstGeom prst="rect">
+            <a:avLst/>
+          </a:prstGeom>
+        </p:spPr>
+        <p:txBody>
+          <a:bodyPr wrap="square">
+            <a:spAutoFit/>
+          </a:bodyPr>
+          <a:lstStyle/>
+          <a:p>
+            <a:r>
+              <a:rPr lang="nl-BE" b="1" dirty="0" smtClean="0"/>
+              <a:t>Extra targets product backlog</a:t>
+            </a:r>
+          </a:p>
+        </p:txBody>
+      </p:sp>
+      <p:sp>
+        <p:nvSpPr>
+          <p:cNvPr id="2" name="Slide Number Placeholder 1"/>
           <p:cNvSpPr>
             <a:spLocks noGrp="1"/>
           </p:cNvSpPr>
           <p:nvPr>
-            <p:ph type="title"/>
+            <p:ph type="sldNum" sz="quarter" idx="11"/>
           </p:nvPr>
         </p:nvSpPr>
         <p:spPr/>
@@ -4297,9 +6409,43 @@
           <a:bodyPr/>
           <a:lstStyle/>
           <a:p>
+            <a:fld id="{A28A35A8-C0E1-4C56-AA56-4AA6340DD3FD}" type="slidenum">
+              <a:rPr lang="nl-BE" smtClean="0"/>
+              <a:t>5</a:t>
+            </a:fld>
+            <a:endParaRPr lang="nl-BE"/>
+          </a:p>
+        </p:txBody>
+      </p:sp>
+      <p:sp>
+        <p:nvSpPr>
+          <p:cNvPr id="5" name="TextBox 4"/>
+          <p:cNvSpPr txBox="1"/>
+          <p:nvPr/>
+        </p:nvSpPr>
+        <p:spPr>
+          <a:xfrm>
+            <a:off x="1513072" y="6248400"/>
+            <a:ext cx="7272808" cy="369332"/>
+          </a:xfrm>
+          <a:prstGeom prst="rect">
+            <a:avLst/>
+          </a:prstGeom>
+          <a:noFill/>
+        </p:spPr>
+        <p:txBody>
+          <a:bodyPr wrap="square" rtlCol="0">
+            <a:spAutoFit/>
+          </a:bodyPr>
+          <a:lstStyle/>
+          <a:p>
+            <a:r>
+              <a:rPr lang="nl-BE" b="1" dirty="0" smtClean="0"/>
+              <a:t>Waar staan we </a:t>
+            </a:r>
             <a:r>
               <a:rPr lang="nl-BE" dirty="0" smtClean="0"/>
-              <a:t>Demo</a:t>
+              <a:t>– Demo – Structuur – Issues – Sprint #2 - Vragen</a:t>
             </a:r>
             <a:endParaRPr lang="nl-BE" dirty="0"/>
           </a:p>
@@ -4308,7 +6454,7 @@
     </p:spTree>
     <p:extLst>
       <p:ext uri="{BB962C8B-B14F-4D97-AF65-F5344CB8AC3E}">
-        <p14:creationId xmlns:p14="http://schemas.microsoft.com/office/powerpoint/2010/main" val="1124438208"/>
+        <p14:creationId xmlns:p14="http://schemas.microsoft.com/office/powerpoint/2010/main" val="2468829193"/>
       </p:ext>
     </p:extLst>
   </p:cSld>
@@ -4359,7 +6505,68 @@
           <a:p>
             <a:r>
               <a:rPr lang="nl-BE" dirty="0" smtClean="0"/>
-              <a:t>Structuur</a:t>
+              <a:t>Demo</a:t>
+            </a:r>
+            <a:endParaRPr lang="nl-BE" dirty="0"/>
+          </a:p>
+        </p:txBody>
+      </p:sp>
+      <p:sp>
+        <p:nvSpPr>
+          <p:cNvPr id="2" name="Slide Number Placeholder 1"/>
+          <p:cNvSpPr>
+            <a:spLocks noGrp="1"/>
+          </p:cNvSpPr>
+          <p:nvPr>
+            <p:ph type="sldNum" sz="quarter" idx="11"/>
+          </p:nvPr>
+        </p:nvSpPr>
+        <p:spPr/>
+        <p:txBody>
+          <a:bodyPr/>
+          <a:lstStyle/>
+          <a:p>
+            <a:fld id="{A28A35A8-C0E1-4C56-AA56-4AA6340DD3FD}" type="slidenum">
+              <a:rPr lang="nl-BE" smtClean="0"/>
+              <a:t>6</a:t>
+            </a:fld>
+            <a:endParaRPr lang="nl-BE"/>
+          </a:p>
+        </p:txBody>
+      </p:sp>
+      <p:sp>
+        <p:nvSpPr>
+          <p:cNvPr id="5" name="TextBox 4"/>
+          <p:cNvSpPr txBox="1"/>
+          <p:nvPr/>
+        </p:nvSpPr>
+        <p:spPr>
+          <a:xfrm>
+            <a:off x="1513072" y="6248400"/>
+            <a:ext cx="7272808" cy="369332"/>
+          </a:xfrm>
+          <a:prstGeom prst="rect">
+            <a:avLst/>
+          </a:prstGeom>
+          <a:noFill/>
+        </p:spPr>
+        <p:txBody>
+          <a:bodyPr wrap="square" rtlCol="0">
+            <a:spAutoFit/>
+          </a:bodyPr>
+          <a:lstStyle/>
+          <a:p>
+            <a:r>
+              <a:rPr lang="nl-BE" dirty="0" smtClean="0"/>
+              <a:t>Waar staan we – </a:t>
+            </a:r>
+            <a:r>
+              <a:rPr lang="nl-BE" b="1" dirty="0" smtClean="0"/>
+              <a:t>Demo</a:t>
+            </a:r>
+            <a:r>
+              <a:rPr lang="nl-BE" dirty="0" smtClean="0"/>
+              <a:t> – Structuur – Issues – Sprint #2 - Vragen</a:t>
             </a:r>
             <a:endParaRPr lang="nl-BE" dirty="0"/>
           </a:p>
@@ -4368,7 +6575,7 @@
     </p:spTree>
     <p:extLst>
       <p:ext uri="{BB962C8B-B14F-4D97-AF65-F5344CB8AC3E}">
-        <p14:creationId xmlns:p14="http://schemas.microsoft.com/office/powerpoint/2010/main" val="2214094110"/>
+        <p14:creationId xmlns:p14="http://schemas.microsoft.com/office/powerpoint/2010/main" val="1124438208"/>
       </p:ext>
     </p:extLst>
   </p:cSld>
@@ -4404,6 +6611,127 @@
       </p:grpSpPr>
       <p:sp>
         <p:nvSpPr>
+          <p:cNvPr id="4" name="Title 3"/>
+          <p:cNvSpPr>
+            <a:spLocks noGrp="1"/>
+          </p:cNvSpPr>
+          <p:nvPr>
+            <p:ph type="title"/>
+          </p:nvPr>
+        </p:nvSpPr>
+        <p:spPr/>
+        <p:txBody>
+          <a:bodyPr/>
+          <a:lstStyle/>
+          <a:p>
+            <a:r>
+              <a:rPr lang="nl-BE" dirty="0" smtClean="0"/>
+              <a:t>Structuur</a:t>
+            </a:r>
+            <a:endParaRPr lang="nl-BE" dirty="0"/>
+          </a:p>
+        </p:txBody>
+      </p:sp>
+      <p:sp>
+        <p:nvSpPr>
+          <p:cNvPr id="2" name="Slide Number Placeholder 1"/>
+          <p:cNvSpPr>
+            <a:spLocks noGrp="1"/>
+          </p:cNvSpPr>
+          <p:nvPr>
+            <p:ph type="sldNum" sz="quarter" idx="11"/>
+          </p:nvPr>
+        </p:nvSpPr>
+        <p:spPr/>
+        <p:txBody>
+          <a:bodyPr/>
+          <a:lstStyle/>
+          <a:p>
+            <a:fld id="{A28A35A8-C0E1-4C56-AA56-4AA6340DD3FD}" type="slidenum">
+              <a:rPr lang="nl-BE" smtClean="0"/>
+              <a:t>7</a:t>
+            </a:fld>
+            <a:endParaRPr lang="nl-BE"/>
+          </a:p>
+        </p:txBody>
+      </p:sp>
+      <p:sp>
+        <p:nvSpPr>
+          <p:cNvPr id="5" name="TextBox 4"/>
+          <p:cNvSpPr txBox="1"/>
+          <p:nvPr/>
+        </p:nvSpPr>
+        <p:spPr>
+          <a:xfrm>
+            <a:off x="1513072" y="6248400"/>
+            <a:ext cx="7272808" cy="369332"/>
+          </a:xfrm>
+          <a:prstGeom prst="rect">
+            <a:avLst/>
+          </a:prstGeom>
+          <a:noFill/>
+        </p:spPr>
+        <p:txBody>
+          <a:bodyPr wrap="square" rtlCol="0">
+            <a:spAutoFit/>
+          </a:bodyPr>
+          <a:lstStyle/>
+          <a:p>
+            <a:r>
+              <a:rPr lang="nl-BE" dirty="0" smtClean="0"/>
+              <a:t>Waar staan we – Demo – </a:t>
+            </a:r>
+            <a:r>
+              <a:rPr lang="nl-BE" b="1" dirty="0" smtClean="0"/>
+              <a:t>Structuur</a:t>
+            </a:r>
+            <a:r>
+              <a:rPr lang="nl-BE" dirty="0" smtClean="0"/>
+              <a:t> – Issues – Sprint #2 - Vragen</a:t>
+            </a:r>
+            <a:endParaRPr lang="nl-BE" dirty="0"/>
+          </a:p>
+        </p:txBody>
+      </p:sp>
+    </p:spTree>
+    <p:extLst>
+      <p:ext uri="{BB962C8B-B14F-4D97-AF65-F5344CB8AC3E}">
+        <p14:creationId xmlns:p14="http://schemas.microsoft.com/office/powerpoint/2010/main" val="2214094110"/>
+      </p:ext>
+    </p:extLst>
+  </p:cSld>
+  <p:clrMapOvr>
+    <a:masterClrMapping/>
+  </p:clrMapOvr>
+  <p:timing>
+    <p:tnLst>
+      <p:par>
+        <p:cTn id="1" dur="indefinite" restart="never" nodeType="tmRoot"/>
+      </p:par>
+    </p:tnLst>
+  </p:timing>
+</p:sld>
+</file>
+
+<file path=ppt/slides/slide8.xml><?xml version="1.0" encoding="utf-8"?>
+<p:sld xmlns:a="http://schemas.openxmlformats.org/drawingml/2006/main" xmlns:r="http://schemas.openxmlformats.org/officeDocument/2006/relationships" xmlns:p="http://schemas.openxmlformats.org/presentationml/2006/main">
+  <p:cSld>
+    <p:spTree>
+      <p:nvGrpSpPr>
+        <p:cNvPr id="1" name=""/>
+        <p:cNvGrpSpPr/>
+        <p:nvPr/>
+      </p:nvGrpSpPr>
+      <p:grpSpPr>
+        <a:xfrm>
+          <a:off x="0" y="0"/>
+          <a:ext cx="0" cy="0"/>
+          <a:chOff x="0" y="0"/>
+          <a:chExt cx="0" cy="0"/>
+        </a:xfrm>
+      </p:grpSpPr>
+      <p:sp>
+        <p:nvSpPr>
           <p:cNvPr id="16" name="Rectangle 15"/>
           <p:cNvSpPr/>
           <p:nvPr/>
@@ -4427,7 +6755,6 @@
               <a:rPr lang="nl-BE" b="1" dirty="0" smtClean="0"/>
               <a:t>Applicatie structuur</a:t>
             </a:r>
-            <a:endParaRPr lang="nl-BE" b="1" dirty="0" smtClean="0"/>
           </a:p>
         </p:txBody>
       </p:sp>
@@ -4454,8 +6781,8 @@
         </p:blipFill>
         <p:spPr bwMode="auto">
           <a:xfrm>
-            <a:off x="1418069" y="1996418"/>
-            <a:ext cx="7048500" cy="4834148"/>
+            <a:off x="1907704" y="1961394"/>
+            <a:ext cx="5982801" cy="4103248"/>
           </a:xfrm>
           <a:prstGeom prst="rect">
             <a:avLst/>
@@ -4495,53 +6822,39 @@
           </a:extLst>
         </p:spPr>
       </p:pic>
-    </p:spTree>
-    <p:extLst>
-      <p:ext uri="{BB962C8B-B14F-4D97-AF65-F5344CB8AC3E}">
-        <p14:creationId xmlns:p14="http://schemas.microsoft.com/office/powerpoint/2010/main" val="3505284540"/>
-      </p:ext>
-    </p:extLst>
-  </p:cSld>
-  <p:clrMapOvr>
-    <a:masterClrMapping/>
-  </p:clrMapOvr>
-  <p:timing>
-    <p:tnLst>
-      <p:par>
-        <p:cTn id="1" dur="indefinite" restart="never" nodeType="tmRoot"/>
-      </p:par>
-    </p:tnLst>
-  </p:timing>
-</p:sld>
-</file>
-
-<file path=ppt/slides/slide8.xml><?xml version="1.0" encoding="utf-8"?>
-<p:sld xmlns:a="http://schemas.openxmlformats.org/drawingml/2006/main" xmlns:r="http://schemas.openxmlformats.org/officeDocument/2006/relationships" xmlns:p="http://schemas.openxmlformats.org/presentationml/2006/main">
-  <p:cSld>
-    <p:spTree>
-      <p:nvGrpSpPr>
-        <p:cNvPr id="1" name=""/>
-        <p:cNvGrpSpPr/>
-        <p:nvPr/>
-      </p:nvGrpSpPr>
-      <p:grpSpPr>
-        <a:xfrm>
-          <a:off x="0" y="0"/>
-          <a:ext cx="0" cy="0"/>
-          <a:chOff x="0" y="0"/>
-          <a:chExt cx="0" cy="0"/>
-        </a:xfrm>
-      </p:grpSpPr>
-      <p:sp>
-        <p:nvSpPr>
-          <p:cNvPr id="15" name="TextBox 14"/>
+      <p:sp>
+        <p:nvSpPr>
+          <p:cNvPr id="2" name="Slide Number Placeholder 1"/>
+          <p:cNvSpPr>
+            <a:spLocks noGrp="1"/>
+          </p:cNvSpPr>
+          <p:nvPr>
+            <p:ph type="sldNum" sz="quarter" idx="11"/>
+          </p:nvPr>
+        </p:nvSpPr>
+        <p:spPr/>
+        <p:txBody>
+          <a:bodyPr/>
+          <a:lstStyle/>
+          <a:p>
+            <a:fld id="{A28A35A8-C0E1-4C56-AA56-4AA6340DD3FD}" type="slidenum">
+              <a:rPr lang="nl-BE" smtClean="0"/>
+              <a:t>8</a:t>
+            </a:fld>
+            <a:endParaRPr lang="nl-BE"/>
+          </a:p>
+        </p:txBody>
+      </p:sp>
+      <p:sp>
+        <p:nvSpPr>
+          <p:cNvPr id="5" name="TextBox 4"/>
           <p:cNvSpPr txBox="1"/>
           <p:nvPr/>
         </p:nvSpPr>
         <p:spPr>
           <a:xfrm>
-            <a:off x="575340" y="2048189"/>
-            <a:ext cx="8064896" cy="4247317"/>
+            <a:off x="1513072" y="6248400"/>
+            <a:ext cx="7272808" cy="369332"/>
           </a:xfrm>
           <a:prstGeom prst="rect">
             <a:avLst/>
@@ -4554,125 +6867,26 @@
           </a:bodyPr>
           <a:lstStyle/>
           <a:p>
-            <a:pPr marL="285750" indent="-285750">
-              <a:buFont typeface="Courier New" pitchFamily="49" charset="0"/>
-              <a:buChar char="o"/>
-            </a:pPr>
             <a:r>
               <a:rPr lang="nl-BE" dirty="0" smtClean="0"/>
-              <a:t>Gebruik van externe perl scripts zonder API key</a:t>
-            </a:r>
-          </a:p>
-          <a:p>
-            <a:pPr marL="285750" indent="-285750">
-              <a:buFont typeface="Courier New" pitchFamily="49" charset="0"/>
-              <a:buChar char="o"/>
-            </a:pPr>
-            <a:endParaRPr lang="nl-BE" dirty="0" smtClean="0"/>
-          </a:p>
-          <a:p>
-            <a:pPr lvl="1"/>
+              <a:t>Waar staan we – Demo – </a:t>
+            </a:r>
+            <a:r>
+              <a:rPr lang="nl-BE" b="1" dirty="0" smtClean="0"/>
+              <a:t>Structuur</a:t>
+            </a:r>
             <a:r>
               <a:rPr lang="nl-BE" dirty="0" smtClean="0"/>
-              <a:t>+ Gemakkelijk aanpasbaar bij wijzigingen</a:t>
-            </a:r>
-          </a:p>
-          <a:p>
-            <a:pPr marL="742950" lvl="1" indent="-285750">
-              <a:buFont typeface="Courier New" pitchFamily="49" charset="0"/>
-              <a:buChar char="o"/>
-            </a:pPr>
-            <a:endParaRPr lang="nl-BE" dirty="0" smtClean="0"/>
-          </a:p>
-          <a:p>
-            <a:pPr lvl="1"/>
-            <a:r>
-              <a:rPr lang="nl-BE" dirty="0" smtClean="0"/>
-              <a:t>+ Geen API key en bijbehorend contract nodig</a:t>
-            </a:r>
-          </a:p>
-          <a:p>
-            <a:pPr marL="742950" lvl="1" indent="-285750">
-              <a:buFont typeface="Courier New" pitchFamily="49" charset="0"/>
-              <a:buChar char="o"/>
-            </a:pPr>
-            <a:endParaRPr lang="nl-BE" dirty="0" smtClean="0"/>
-          </a:p>
-          <a:p>
-            <a:pPr lvl="1"/>
-            <a:r>
-              <a:rPr lang="nl-BE" dirty="0" smtClean="0"/>
-              <a:t>+ En dus geen limiet</a:t>
-            </a:r>
-          </a:p>
-          <a:p>
-            <a:pPr marL="742950" lvl="1" indent="-285750">
-              <a:buFont typeface="Courier New" pitchFamily="49" charset="0"/>
-              <a:buChar char="o"/>
-            </a:pPr>
-            <a:endParaRPr lang="nl-BE" dirty="0" smtClean="0"/>
-          </a:p>
-          <a:p>
-            <a:pPr lvl="1"/>
-            <a:r>
-              <a:rPr lang="nl-BE" dirty="0" smtClean="0"/>
-              <a:t>- Maakt gebruik via undocumented API/front end website scraping en dus minder stabiel bij wijzigingen</a:t>
-            </a:r>
-          </a:p>
-          <a:p>
-            <a:endParaRPr lang="nl-BE" dirty="0" smtClean="0"/>
-          </a:p>
-          <a:p>
-            <a:pPr marL="285750" indent="-285750">
-              <a:buFont typeface="Courier New" pitchFamily="49" charset="0"/>
-              <a:buChar char="o"/>
-            </a:pPr>
-            <a:endParaRPr lang="nl-BE" dirty="0" smtClean="0"/>
-          </a:p>
-          <a:p>
-            <a:endParaRPr lang="nl-BE" dirty="0" smtClean="0"/>
-          </a:p>
-          <a:p>
-            <a:endParaRPr lang="nl-BE" dirty="0" smtClean="0"/>
-          </a:p>
-          <a:p>
+              <a:t> – Issues – Sprint #2 - Vragen</a:t>
+            </a:r>
             <a:endParaRPr lang="nl-BE" dirty="0"/>
-          </a:p>
-        </p:txBody>
-      </p:sp>
-      <p:sp>
-        <p:nvSpPr>
-          <p:cNvPr id="16" name="Rectangle 15"/>
-          <p:cNvSpPr/>
-          <p:nvPr/>
-        </p:nvSpPr>
-        <p:spPr>
-          <a:xfrm>
-            <a:off x="683568" y="1592062"/>
-            <a:ext cx="4032448" cy="369332"/>
-          </a:xfrm>
-          <a:prstGeom prst="rect">
-            <a:avLst/>
-          </a:prstGeom>
-        </p:spPr>
-        <p:txBody>
-          <a:bodyPr wrap="square">
-            <a:spAutoFit/>
-          </a:bodyPr>
-          <a:lstStyle/>
-          <a:p>
-            <a:r>
-              <a:rPr lang="nl-BE" b="1" dirty="0" smtClean="0"/>
-              <a:t>Verzamelen van gegevens</a:t>
-            </a:r>
-            <a:endParaRPr lang="nl-BE" b="1" dirty="0" smtClean="0"/>
           </a:p>
         </p:txBody>
       </p:sp>
     </p:spTree>
     <p:extLst>
       <p:ext uri="{BB962C8B-B14F-4D97-AF65-F5344CB8AC3E}">
-        <p14:creationId xmlns:p14="http://schemas.microsoft.com/office/powerpoint/2010/main" val="3320250108"/>
+        <p14:creationId xmlns:p14="http://schemas.microsoft.com/office/powerpoint/2010/main" val="3505284540"/>
       </p:ext>
     </p:extLst>
   </p:cSld>
@@ -4708,102 +6922,6 @@
       </p:grpSpPr>
       <p:sp>
         <p:nvSpPr>
-          <p:cNvPr id="15" name="TextBox 14"/>
-          <p:cNvSpPr txBox="1"/>
-          <p:nvPr/>
-        </p:nvSpPr>
-        <p:spPr>
-          <a:xfrm>
-            <a:off x="575340" y="2048189"/>
-            <a:ext cx="8064896" cy="3693319"/>
-          </a:xfrm>
-          <a:prstGeom prst="rect">
-            <a:avLst/>
-          </a:prstGeom>
-          <a:noFill/>
-        </p:spPr>
-        <p:txBody>
-          <a:bodyPr wrap="square" rtlCol="0">
-            <a:spAutoFit/>
-          </a:bodyPr>
-          <a:lstStyle/>
-          <a:p>
-            <a:pPr marL="285750" indent="-285750">
-              <a:buFont typeface="Courier New" pitchFamily="49" charset="0"/>
-              <a:buChar char="o"/>
-            </a:pPr>
-            <a:r>
-              <a:rPr lang="nl-BE" dirty="0" smtClean="0"/>
-              <a:t>Fallback naar API met verkregen API key</a:t>
-            </a:r>
-          </a:p>
-          <a:p>
-            <a:pPr marL="285750" indent="-285750">
-              <a:buFont typeface="Courier New" pitchFamily="49" charset="0"/>
-              <a:buChar char="o"/>
-            </a:pPr>
-            <a:endParaRPr lang="nl-BE" dirty="0" smtClean="0"/>
-          </a:p>
-          <a:p>
-            <a:pPr lvl="1"/>
-            <a:r>
-              <a:rPr lang="nl-BE" dirty="0" smtClean="0"/>
-              <a:t>+ Zorgt ervoor dat er geen gaten in de gegevens komen</a:t>
-            </a:r>
-          </a:p>
-          <a:p>
-            <a:pPr marL="742950" lvl="1" indent="-285750">
-              <a:buFont typeface="Courier New" pitchFamily="49" charset="0"/>
-              <a:buChar char="o"/>
-            </a:pPr>
-            <a:endParaRPr lang="nl-BE" dirty="0" smtClean="0"/>
-          </a:p>
-          <a:p>
-            <a:pPr lvl="1"/>
-            <a:r>
-              <a:rPr lang="nl-BE" dirty="0" smtClean="0"/>
-              <a:t>+ Gebruikt enkel API key wanneer scrapen mislukt</a:t>
-            </a:r>
-          </a:p>
-          <a:p>
-            <a:pPr lvl="1"/>
-            <a:endParaRPr lang="nl-BE" dirty="0" smtClean="0"/>
-          </a:p>
-          <a:p>
-            <a:pPr lvl="1"/>
-            <a:r>
-              <a:rPr lang="nl-BE" dirty="0" smtClean="0"/>
-              <a:t>- API key licentie nodig</a:t>
-            </a:r>
-            <a:endParaRPr lang="nl-BE" dirty="0" smtClean="0"/>
-          </a:p>
-          <a:p>
-            <a:pPr lvl="1"/>
-            <a:endParaRPr lang="nl-BE" dirty="0" smtClean="0"/>
-          </a:p>
-          <a:p>
-            <a:endParaRPr lang="nl-BE" dirty="0" smtClean="0"/>
-          </a:p>
-          <a:p>
-            <a:pPr marL="285750" indent="-285750">
-              <a:buFont typeface="Courier New" pitchFamily="49" charset="0"/>
-              <a:buChar char="o"/>
-            </a:pPr>
-            <a:endParaRPr lang="nl-BE" dirty="0" smtClean="0"/>
-          </a:p>
-          <a:p>
-            <a:endParaRPr lang="nl-BE" dirty="0" smtClean="0"/>
-          </a:p>
-          <a:p>
-            <a:endParaRPr lang="nl-BE" dirty="0" smtClean="0"/>
-          </a:p>
-          <a:p>
-            <a:endParaRPr lang="nl-BE" dirty="0"/>
-          </a:p>
-        </p:txBody>
-      </p:sp>
-      <p:sp>
-        <p:nvSpPr>
           <p:cNvPr id="16" name="Rectangle 15"/>
           <p:cNvSpPr/>
           <p:nvPr/>
@@ -4825,16 +6943,105 @@
           <a:p>
             <a:r>
               <a:rPr lang="nl-BE" b="1" dirty="0" smtClean="0"/>
-              <a:t>Verzamelen van gegevens</a:t>
+              <a:t>Huidige product </a:t>
+            </a:r>
+            <a:r>
+              <a:rPr lang="nl-BE" b="1" dirty="0" err="1" smtClean="0"/>
+              <a:t>backlog</a:t>
             </a:r>
             <a:endParaRPr lang="nl-BE" b="1" dirty="0" smtClean="0"/>
           </a:p>
         </p:txBody>
       </p:sp>
+      <p:sp>
+        <p:nvSpPr>
+          <p:cNvPr id="2" name="Slide Number Placeholder 1"/>
+          <p:cNvSpPr>
+            <a:spLocks noGrp="1"/>
+          </p:cNvSpPr>
+          <p:nvPr>
+            <p:ph type="sldNum" sz="quarter" idx="11"/>
+          </p:nvPr>
+        </p:nvSpPr>
+        <p:spPr/>
+        <p:txBody>
+          <a:bodyPr/>
+          <a:lstStyle/>
+          <a:p>
+            <a:fld id="{A28A35A8-C0E1-4C56-AA56-4AA6340DD3FD}" type="slidenum">
+              <a:rPr lang="nl-BE" smtClean="0"/>
+              <a:t>9</a:t>
+            </a:fld>
+            <a:endParaRPr lang="nl-BE"/>
+          </a:p>
+        </p:txBody>
+      </p:sp>
+      <p:sp>
+        <p:nvSpPr>
+          <p:cNvPr id="5" name="TextBox 4"/>
+          <p:cNvSpPr txBox="1"/>
+          <p:nvPr/>
+        </p:nvSpPr>
+        <p:spPr>
+          <a:xfrm>
+            <a:off x="1513072" y="6248400"/>
+            <a:ext cx="7272808" cy="369332"/>
+          </a:xfrm>
+          <a:prstGeom prst="rect">
+            <a:avLst/>
+          </a:prstGeom>
+          <a:noFill/>
+        </p:spPr>
+        <p:txBody>
+          <a:bodyPr wrap="square" rtlCol="0">
+            <a:spAutoFit/>
+          </a:bodyPr>
+          <a:lstStyle/>
+          <a:p>
+            <a:r>
+              <a:rPr lang="nl-BE" dirty="0" smtClean="0"/>
+              <a:t>Waar staan we – Demo – </a:t>
+            </a:r>
+            <a:r>
+              <a:rPr lang="nl-BE" b="1" dirty="0" smtClean="0"/>
+              <a:t>Structuur</a:t>
+            </a:r>
+            <a:r>
+              <a:rPr lang="nl-BE" dirty="0" smtClean="0"/>
+              <a:t> – Issues – Sprint #2 - Vragen</a:t>
+            </a:r>
+            <a:endParaRPr lang="nl-BE" dirty="0"/>
+          </a:p>
+        </p:txBody>
+      </p:sp>
+      <p:pic>
+        <p:nvPicPr>
+          <p:cNvPr id="3" name="Picture 2"/>
+          <p:cNvPicPr>
+            <a:picLocks noChangeAspect="1"/>
+          </p:cNvPicPr>
+          <p:nvPr/>
+        </p:nvPicPr>
+        <p:blipFill>
+          <a:blip r:embed="rId2"/>
+          <a:stretch>
+            <a:fillRect/>
+          </a:stretch>
+        </p:blipFill>
+        <p:spPr>
+          <a:xfrm>
+            <a:off x="4211960" y="1592062"/>
+            <a:ext cx="3954979" cy="4349053"/>
+          </a:xfrm>
+          <a:prstGeom prst="rect">
+            <a:avLst/>
+          </a:prstGeom>
+        </p:spPr>
+      </p:pic>
     </p:spTree>
     <p:extLst>
       <p:ext uri="{BB962C8B-B14F-4D97-AF65-F5344CB8AC3E}">
-        <p14:creationId xmlns:p14="http://schemas.microsoft.com/office/powerpoint/2010/main" val="1434016546"/>
+        <p14:creationId xmlns:p14="http://schemas.microsoft.com/office/powerpoint/2010/main" val="1069389013"/>
       </p:ext>
     </p:extLst>
   </p:cSld>
@@ -5362,4 +7569,265 @@
     </a:extraClrScheme>
   </a:extraClrSchemeLst>
 </a:theme>
+</file>
+
+<file path=ppt/theme/theme2.xml><?xml version="1.0" encoding="utf-8"?>
+<a:theme xmlns:a="http://schemas.openxmlformats.org/drawingml/2006/main" name="Office Theme">
+  <a:themeElements>
+    <a:clrScheme name="Office">
+      <a:dk1>
+        <a:sysClr val="windowText" lastClr="000000"/>
+      </a:dk1>
+      <a:lt1>
+        <a:sysClr val="window" lastClr="FFFFFF"/>
+      </a:lt1>
+      <a:dk2>
+        <a:srgbClr val="44546A"/>
+      </a:dk2>
+      <a:lt2>
+        <a:srgbClr val="E7E6E6"/>
+      </a:lt2>
+      <a:accent1>
+        <a:srgbClr val="5B9BD5"/>
+      </a:accent1>
+      <a:accent2>
+        <a:srgbClr val="ED7D31"/>
+      </a:accent2>
+      <a:accent3>
+        <a:srgbClr val="A5A5A5"/>
+      </a:accent3>
+      <a:accent4>
+        <a:srgbClr val="FFC000"/>
+      </a:accent4>
+      <a:accent5>
+        <a:srgbClr val="4472C4"/>
+      </a:accent5>
+      <a:accent6>
+        <a:srgbClr val="70AD47"/>
+      </a:accent6>
+      <a:hlink>
+        <a:srgbClr val="0563C1"/>
+      </a:hlink>
+      <a:folHlink>
+        <a:srgbClr val="954F72"/>
+      </a:folHlink>
+    </a:clrScheme>
+    <a:fontScheme name="Office">
+      <a:majorFont>
+        <a:latin typeface="Calibri Light" panose="020F0302020204030204"/>
+        <a:ea typeface=""/>
+        <a:cs typeface=""/>
+        <a:font script="Jpan" typeface="ＭＳ Ｐゴシック"/>
+        <a:font script="Hang" typeface="맑은 고딕"/>
+        <a:font script="Hans" typeface="宋体"/>
+        <a:font script="Hant" typeface="新細明體"/>
+        <a:font script="Arab" typeface="Times New Roman"/>
+        <a:font script="Hebr" typeface="Times New Roman"/>
+        <a:font script="Thai" typeface="Angsana New"/>
+        <a:font script="Ethi" typeface="Nyala"/>
+        <a:font script="Beng" typeface="Vrinda"/>
+        <a:font script="Gujr" typeface="Shruti"/>
+        <a:font script="Khmr" typeface="MoolBoran"/>
+        <a:font script="Knda" typeface="Tunga"/>
+        <a:font script="Guru" typeface="Raavi"/>
+        <a:font script="Cans" typeface="Euphemia"/>
+        <a:font script="Cher" typeface="Plantagenet Cherokee"/>
+        <a:font script="Yiii" typeface="Microsoft Yi Baiti"/>
+        <a:font script="Tibt" typeface="Microsoft Himalaya"/>
+        <a:font script="Thaa" typeface="MV Boli"/>
+        <a:font script="Deva" typeface="Mangal"/>
+        <a:font script="Telu" typeface="Gautami"/>
+        <a:font script="Taml" typeface="Latha"/>
+        <a:font script="Syrc" typeface="Estrangelo Edessa"/>
+        <a:font script="Orya" typeface="Kalinga"/>
+        <a:font script="Mlym" typeface="Kartika"/>
+        <a:font script="Laoo" typeface="DokChampa"/>
+        <a:font script="Sinh" typeface="Iskoola Pota"/>
+        <a:font script="Mong" typeface="Mongolian Baiti"/>
+        <a:font script="Viet" typeface="Times New Roman"/>
+        <a:font script="Uigh" typeface="Microsoft Uighur"/>
+        <a:font script="Geor" typeface="Sylfaen"/>
+      </a:majorFont>
+      <a:minorFont>
+        <a:latin typeface="Calibri" panose="020F0502020204030204"/>
+        <a:ea typeface=""/>
+        <a:cs typeface=""/>
+        <a:font script="Jpan" typeface="ＭＳ Ｐゴシック"/>
+        <a:font script="Hang" typeface="맑은 고딕"/>
+        <a:font script="Hans" typeface="宋体"/>
+        <a:font script="Hant" typeface="新細明體"/>
+        <a:font script="Arab" typeface="Arial"/>
+        <a:font script="Hebr" typeface="Arial"/>
+        <a:font script="Thai" typeface="Cordia New"/>
+        <a:font script="Ethi" typeface="Nyala"/>
+        <a:font script="Beng" typeface="Vrinda"/>
+        <a:font script="Gujr" typeface="Shruti"/>
+        <a:font script="Khmr" typeface="DaunPenh"/>
+        <a:font script="Knda" typeface="Tunga"/>
+        <a:font script="Guru" typeface="Raavi"/>
+        <a:font script="Cans" typeface="Euphemia"/>
+        <a:font script="Cher" typeface="Plantagenet Cherokee"/>
+        <a:font script="Yiii" typeface="Microsoft Yi Baiti"/>
+        <a:font script="Tibt" typeface="Microsoft Himalaya"/>
+        <a:font script="Thaa" typeface="MV Boli"/>
+        <a:font script="Deva" typeface="Mangal"/>
+        <a:font script="Telu" typeface="Gautami"/>
+        <a:font script="Taml" typeface="Latha"/>
+        <a:font script="Syrc" typeface="Estrangelo Edessa"/>
+        <a:font script="Orya" typeface="Kalinga"/>
+        <a:font script="Mlym" typeface="Kartika"/>
+        <a:font script="Laoo" typeface="DokChampa"/>
+        <a:font script="Sinh" typeface="Iskoola Pota"/>
+        <a:font script="Mong" typeface="Mongolian Baiti"/>
+        <a:font script="Viet" typeface="Arial"/>
+        <a:font script="Uigh" typeface="Microsoft Uighur"/>
+        <a:font script="Geor" typeface="Sylfaen"/>
+      </a:minorFont>
+    </a:fontScheme>
+    <a:fmtScheme name="Office">
+      <a:fillStyleLst>
+        <a:solidFill>
+          <a:schemeClr val="phClr"/>
+        </a:solidFill>
+        <a:gradFill rotWithShape="1">
+          <a:gsLst>
+            <a:gs pos="0">
+              <a:schemeClr val="phClr">
+                <a:lumMod val="110000"/>
+                <a:satMod val="105000"/>
+                <a:tint val="67000"/>
+              </a:schemeClr>
+            </a:gs>
+            <a:gs pos="50000">
+              <a:schemeClr val="phClr">
+                <a:lumMod val="105000"/>
+                <a:satMod val="103000"/>
+                <a:tint val="73000"/>
+              </a:schemeClr>
+            </a:gs>
+            <a:gs pos="100000">
+              <a:schemeClr val="phClr">
+                <a:lumMod val="105000"/>
+                <a:satMod val="109000"/>
+                <a:tint val="81000"/>
+              </a:schemeClr>
+            </a:gs>
+          </a:gsLst>
+          <a:lin ang="5400000" scaled="0"/>
+        </a:gradFill>
+        <a:gradFill rotWithShape="1">
+          <a:gsLst>
+            <a:gs pos="0">
+              <a:schemeClr val="phClr">
+                <a:satMod val="103000"/>
+                <a:lumMod val="102000"/>
+                <a:tint val="94000"/>
+              </a:schemeClr>
+            </a:gs>
+            <a:gs pos="50000">
+              <a:schemeClr val="phClr">
+                <a:satMod val="110000"/>
+                <a:lumMod val="100000"/>
+                <a:shade val="100000"/>
+              </a:schemeClr>
+            </a:gs>
+            <a:gs pos="100000">
+              <a:schemeClr val="phClr">
+                <a:lumMod val="99000"/>
+                <a:satMod val="120000"/>
+                <a:shade val="78000"/>
+              </a:schemeClr>
+            </a:gs>
+          </a:gsLst>
+          <a:lin ang="5400000" scaled="0"/>
+        </a:gradFill>
+      </a:fillStyleLst>
+      <a:lnStyleLst>
+        <a:ln w="6350" cap="flat" cmpd="sng" algn="ctr">
+          <a:solidFill>
+            <a:schemeClr val="phClr"/>
+          </a:solidFill>
+          <a:prstDash val="solid"/>
+          <a:miter lim="800000"/>
+        </a:ln>
+        <a:ln w="12700" cap="flat" cmpd="sng" algn="ctr">
+          <a:solidFill>
+            <a:schemeClr val="phClr"/>
+          </a:solidFill>
+          <a:prstDash val="solid"/>
+          <a:miter lim="800000"/>
+        </a:ln>
+        <a:ln w="19050" cap="flat" cmpd="sng" algn="ctr">
+          <a:solidFill>
+            <a:schemeClr val="phClr"/>
+          </a:solidFill>
+          <a:prstDash val="solid"/>
+          <a:miter lim="800000"/>
+        </a:ln>
+      </a:lnStyleLst>
+      <a:effectStyleLst>
+        <a:effectStyle>
+          <a:effectLst/>
+        </a:effectStyle>
+        <a:effectStyle>
+          <a:effectLst/>
+        </a:effectStyle>
+        <a:effectStyle>
+          <a:effectLst>
+            <a:outerShdw blurRad="57150" dist="19050" dir="5400000" algn="ctr" rotWithShape="0">
+              <a:srgbClr val="000000">
+                <a:alpha val="63000"/>
+              </a:srgbClr>
+            </a:outerShdw>
+          </a:effectLst>
+        </a:effectStyle>
+      </a:effectStyleLst>
+      <a:bgFillStyleLst>
+        <a:solidFill>
+          <a:schemeClr val="phClr"/>
+        </a:solidFill>
+        <a:solidFill>
+          <a:schemeClr val="phClr">
+            <a:tint val="95000"/>
+            <a:satMod val="170000"/>
+          </a:schemeClr>
+        </a:solidFill>
+        <a:gradFill rotWithShape="1">
+          <a:gsLst>
+            <a:gs pos="0">
+              <a:schemeClr val="phClr">
+                <a:tint val="93000"/>
+                <a:satMod val="150000"/>
+                <a:shade val="98000"/>
+                <a:lumMod val="102000"/>
+              </a:schemeClr>
+            </a:gs>
+            <a:gs pos="50000">
+              <a:schemeClr val="phClr">
+                <a:tint val="98000"/>
+                <a:satMod val="130000"/>
+                <a:shade val="90000"/>
+                <a:lumMod val="103000"/>
+              </a:schemeClr>
+            </a:gs>
+            <a:gs pos="100000">
+              <a:schemeClr val="phClr">
+                <a:shade val="63000"/>
+                <a:satMod val="120000"/>
+              </a:schemeClr>
+            </a:gs>
+          </a:gsLst>
+          <a:lin ang="5400000" scaled="0"/>
+        </a:gradFill>
+      </a:bgFillStyleLst>
+    </a:fmtScheme>
+  </a:themeElements>
+  <a:objectDefaults/>
+  <a:extraClrSchemeLst/>
+  <a:extLst>
+    <a:ext uri="{05A4C25C-085E-4340-85A3-A5531E510DB2}">
+      <thm15:themeFamily xmlns:thm15="http://schemas.microsoft.com/office/thememl/2012/main" name="Office Theme" id="{62F939B6-93AF-4DB8-9C6B-D6C7DFDC589F}" vid="{4A3C46E8-61CC-4603-A589-7422A47A8E4A}"/>
+    </a:ext>
+  </a:extLst>
+</a:theme>
 </file>
</xml_diff>